<commit_message>
Added some new design stuff
</commit_message>
<xml_diff>
--- a/Aquatic-Macroinvert-Poster-CB-CW-JR.pptx
+++ b/Aquatic-Macroinvert-Poster-CB-CW-JR.pptx
@@ -143,9 +143,118 @@
 <file path=ppt/revisionInfo.xml><?xml version="1.0" encoding="utf-8"?>
 <p1510:revInfo xmlns:a="http://schemas.openxmlformats.org/drawingml/2006/main" xmlns:r="http://schemas.openxmlformats.org/officeDocument/2006/relationships" xmlns:p1510="http://schemas.microsoft.com/office/powerpoint/2015/10/main">
   <p1510:revLst>
-    <p1510:client id="{B48810D3-471E-4D0F-A972-EE37187B2C82}" v="4" dt="2023-04-21T18:20:10.405"/>
+    <p1510:client id="{C48A9D43-CBDC-48C1-889C-5E21AE79472F}" v="72" dt="2023-04-24T21:33:05.667"/>
   </p1510:revLst>
 </p1510:revInfo>
+</file>
+
+<file path=ppt/changesInfos/changesInfo1.xml><?xml version="1.0" encoding="utf-8"?>
+<pc:chgInfo xmlns:a="http://schemas.openxmlformats.org/drawingml/2006/main" xmlns:r="http://schemas.openxmlformats.org/officeDocument/2006/relationships" xmlns:ac="http://schemas.microsoft.com/office/drawing/2013/main/command" xmlns:pc="http://schemas.microsoft.com/office/powerpoint/2013/main/command">
+  <pc:docChgLst>
+    <pc:chgData name="Jonathan Ray" userId="b9a55652e1e422c6" providerId="LiveId" clId="{C48A9D43-CBDC-48C1-889C-5E21AE79472F}"/>
+    <pc:docChg chg="undo redo custSel modSld">
+      <pc:chgData name="Jonathan Ray" userId="b9a55652e1e422c6" providerId="LiveId" clId="{C48A9D43-CBDC-48C1-889C-5E21AE79472F}" dt="2023-04-24T21:33:50.417" v="260" actId="5793"/>
+      <pc:docMkLst>
+        <pc:docMk/>
+      </pc:docMkLst>
+      <pc:sldChg chg="addSp delSp modSp mod">
+        <pc:chgData name="Jonathan Ray" userId="b9a55652e1e422c6" providerId="LiveId" clId="{C48A9D43-CBDC-48C1-889C-5E21AE79472F}" dt="2023-04-24T21:33:50.417" v="260" actId="5793"/>
+        <pc:sldMkLst>
+          <pc:docMk/>
+          <pc:sldMk cId="1439006157" sldId="258"/>
+        </pc:sldMkLst>
+        <pc:spChg chg="mod">
+          <ac:chgData name="Jonathan Ray" userId="b9a55652e1e422c6" providerId="LiveId" clId="{C48A9D43-CBDC-48C1-889C-5E21AE79472F}" dt="2023-04-24T21:33:50.417" v="260" actId="5793"/>
+          <ac:spMkLst>
+            <pc:docMk/>
+            <pc:sldMk cId="1439006157" sldId="258"/>
+            <ac:spMk id="8" creationId="{6B539B43-F688-8CDC-1ADF-5582C68FB58E}"/>
+          </ac:spMkLst>
+        </pc:spChg>
+        <pc:spChg chg="del mod">
+          <ac:chgData name="Jonathan Ray" userId="b9a55652e1e422c6" providerId="LiveId" clId="{C48A9D43-CBDC-48C1-889C-5E21AE79472F}" dt="2023-04-24T21:32:20.768" v="228" actId="478"/>
+          <ac:spMkLst>
+            <pc:docMk/>
+            <pc:sldMk cId="1439006157" sldId="258"/>
+            <ac:spMk id="10" creationId="{041A92AD-E424-C51F-8A61-F39A4ABFB6C3}"/>
+          </ac:spMkLst>
+        </pc:spChg>
+        <pc:spChg chg="mod">
+          <ac:chgData name="Jonathan Ray" userId="b9a55652e1e422c6" providerId="LiveId" clId="{C48A9D43-CBDC-48C1-889C-5E21AE79472F}" dt="2023-04-24T21:31:09.630" v="220" actId="20577"/>
+          <ac:spMkLst>
+            <pc:docMk/>
+            <pc:sldMk cId="1439006157" sldId="258"/>
+            <ac:spMk id="19" creationId="{00000000-0000-0000-0000-000000000000}"/>
+          </ac:spMkLst>
+        </pc:spChg>
+        <pc:spChg chg="add mod">
+          <ac:chgData name="Jonathan Ray" userId="b9a55652e1e422c6" providerId="LiveId" clId="{C48A9D43-CBDC-48C1-889C-5E21AE79472F}" dt="2023-04-24T21:33:34.223" v="258"/>
+          <ac:spMkLst>
+            <pc:docMk/>
+            <pc:sldMk cId="1439006157" sldId="258"/>
+            <ac:spMk id="29" creationId="{C0342443-3EFE-323D-98FE-0D7B60834B58}"/>
+          </ac:spMkLst>
+        </pc:spChg>
+        <pc:spChg chg="add del mod">
+          <ac:chgData name="Jonathan Ray" userId="b9a55652e1e422c6" providerId="LiveId" clId="{C48A9D43-CBDC-48C1-889C-5E21AE79472F}" dt="2023-04-24T21:32:46.544" v="233"/>
+          <ac:spMkLst>
+            <pc:docMk/>
+            <pc:sldMk cId="1439006157" sldId="258"/>
+            <ac:spMk id="30" creationId="{94E7B97C-B277-4A0F-342E-796762EA7B3E}"/>
+          </ac:spMkLst>
+        </pc:spChg>
+        <pc:picChg chg="del">
+          <ac:chgData name="Jonathan Ray" userId="b9a55652e1e422c6" providerId="LiveId" clId="{C48A9D43-CBDC-48C1-889C-5E21AE79472F}" dt="2023-04-24T21:15:53.603" v="0" actId="478"/>
+          <ac:picMkLst>
+            <pc:docMk/>
+            <pc:sldMk cId="1439006157" sldId="258"/>
+            <ac:picMk id="7" creationId="{B6F3872D-AFCF-76F9-B4EC-DED08D7B5FC8}"/>
+          </ac:picMkLst>
+        </pc:picChg>
+        <pc:picChg chg="add mod">
+          <ac:chgData name="Jonathan Ray" userId="b9a55652e1e422c6" providerId="LiveId" clId="{C48A9D43-CBDC-48C1-889C-5E21AE79472F}" dt="2023-04-24T21:25:23.905" v="127" actId="1076"/>
+          <ac:picMkLst>
+            <pc:docMk/>
+            <pc:sldMk cId="1439006157" sldId="258"/>
+            <ac:picMk id="13" creationId="{1A8E12F4-B195-F3ED-B486-1288DA31A6F3}"/>
+          </ac:picMkLst>
+        </pc:picChg>
+        <pc:picChg chg="add mod">
+          <ac:chgData name="Jonathan Ray" userId="b9a55652e1e422c6" providerId="LiveId" clId="{C48A9D43-CBDC-48C1-889C-5E21AE79472F}" dt="2023-04-24T21:28:50.126" v="206" actId="1076"/>
+          <ac:picMkLst>
+            <pc:docMk/>
+            <pc:sldMk cId="1439006157" sldId="258"/>
+            <ac:picMk id="21" creationId="{14705122-2EF9-4F84-7661-1121BFDE1ED6}"/>
+          </ac:picMkLst>
+        </pc:picChg>
+        <pc:picChg chg="add mod">
+          <ac:chgData name="Jonathan Ray" userId="b9a55652e1e422c6" providerId="LiveId" clId="{C48A9D43-CBDC-48C1-889C-5E21AE79472F}" dt="2023-04-24T21:29:18.689" v="210" actId="1076"/>
+          <ac:picMkLst>
+            <pc:docMk/>
+            <pc:sldMk cId="1439006157" sldId="258"/>
+            <ac:picMk id="24" creationId="{6F027826-D590-3FB1-E4D9-6967DA5686B1}"/>
+          </ac:picMkLst>
+        </pc:picChg>
+        <pc:picChg chg="add del mod ord">
+          <ac:chgData name="Jonathan Ray" userId="b9a55652e1e422c6" providerId="LiveId" clId="{C48A9D43-CBDC-48C1-889C-5E21AE79472F}" dt="2023-04-24T21:32:18.434" v="227" actId="478"/>
+          <ac:picMkLst>
+            <pc:docMk/>
+            <pc:sldMk cId="1439006157" sldId="258"/>
+            <ac:picMk id="28" creationId="{7D254BEF-2465-85E2-3B3D-EDF31AFD49D0}"/>
+          </ac:picMkLst>
+        </pc:picChg>
+        <pc:picChg chg="add del mod">
+          <ac:chgData name="Jonathan Ray" userId="b9a55652e1e422c6" providerId="LiveId" clId="{C48A9D43-CBDC-48C1-889C-5E21AE79472F}" dt="2023-04-24T21:17:23.016" v="4"/>
+          <ac:picMkLst>
+            <pc:docMk/>
+            <pc:sldMk cId="1439006157" sldId="258"/>
+            <ac:picMk id="1026" creationId="{F81BB108-4117-D964-8D2F-75DF3E8FCB85}"/>
+          </ac:picMkLst>
+        </pc:picChg>
+      </pc:sldChg>
+    </pc:docChg>
+  </pc:docChgLst>
+</pc:chgInfo>
 </file>
 
 <file path=ppt/notesMasters/notesMaster1.xml><?xml version="1.0" encoding="utf-8"?>
@@ -230,7 +339,7 @@
           <a:p>
             <a:fld id="{C8685A03-C055-4A50-BB75-8419692FA181}" type="datetimeFigureOut">
               <a:rPr lang="en-US" smtClean="0"/>
-              <a:t>4/24/23</a:t>
+              <a:t>4/24/2023</a:t>
             </a:fld>
             <a:endParaRPr lang="en-US"/>
           </a:p>
@@ -628,7 +737,7 @@
           <a:p>
             <a:fld id="{17E1FF6A-9A55-7A49-AA3D-2E4EBBB4B541}" type="datetimeFigureOut">
               <a:rPr lang="en-US" smtClean="0"/>
-              <a:t>4/24/23</a:t>
+              <a:t>4/24/2023</a:t>
             </a:fld>
             <a:endParaRPr lang="en-US"/>
           </a:p>
@@ -798,7 +907,7 @@
           <a:p>
             <a:fld id="{17E1FF6A-9A55-7A49-AA3D-2E4EBBB4B541}" type="datetimeFigureOut">
               <a:rPr lang="en-US" smtClean="0"/>
-              <a:t>4/24/23</a:t>
+              <a:t>4/24/2023</a:t>
             </a:fld>
             <a:endParaRPr lang="en-US"/>
           </a:p>
@@ -978,7 +1087,7 @@
           <a:p>
             <a:fld id="{17E1FF6A-9A55-7A49-AA3D-2E4EBBB4B541}" type="datetimeFigureOut">
               <a:rPr lang="en-US" smtClean="0"/>
-              <a:t>4/24/23</a:t>
+              <a:t>4/24/2023</a:t>
             </a:fld>
             <a:endParaRPr lang="en-US"/>
           </a:p>
@@ -1148,7 +1257,7 @@
           <a:p>
             <a:fld id="{17E1FF6A-9A55-7A49-AA3D-2E4EBBB4B541}" type="datetimeFigureOut">
               <a:rPr lang="en-US" smtClean="0"/>
-              <a:t>4/24/23</a:t>
+              <a:t>4/24/2023</a:t>
             </a:fld>
             <a:endParaRPr lang="en-US"/>
           </a:p>
@@ -1392,7 +1501,7 @@
           <a:p>
             <a:fld id="{17E1FF6A-9A55-7A49-AA3D-2E4EBBB4B541}" type="datetimeFigureOut">
               <a:rPr lang="en-US" smtClean="0"/>
-              <a:t>4/24/23</a:t>
+              <a:t>4/24/2023</a:t>
             </a:fld>
             <a:endParaRPr lang="en-US"/>
           </a:p>
@@ -1624,7 +1733,7 @@
           <a:p>
             <a:fld id="{17E1FF6A-9A55-7A49-AA3D-2E4EBBB4B541}" type="datetimeFigureOut">
               <a:rPr lang="en-US" smtClean="0"/>
-              <a:t>4/24/23</a:t>
+              <a:t>4/24/2023</a:t>
             </a:fld>
             <a:endParaRPr lang="en-US"/>
           </a:p>
@@ -1991,7 +2100,7 @@
           <a:p>
             <a:fld id="{17E1FF6A-9A55-7A49-AA3D-2E4EBBB4B541}" type="datetimeFigureOut">
               <a:rPr lang="en-US" smtClean="0"/>
-              <a:t>4/24/23</a:t>
+              <a:t>4/24/2023</a:t>
             </a:fld>
             <a:endParaRPr lang="en-US"/>
           </a:p>
@@ -2109,7 +2218,7 @@
           <a:p>
             <a:fld id="{17E1FF6A-9A55-7A49-AA3D-2E4EBBB4B541}" type="datetimeFigureOut">
               <a:rPr lang="en-US" smtClean="0"/>
-              <a:t>4/24/23</a:t>
+              <a:t>4/24/2023</a:t>
             </a:fld>
             <a:endParaRPr lang="en-US"/>
           </a:p>
@@ -2204,7 +2313,7 @@
           <a:p>
             <a:fld id="{17E1FF6A-9A55-7A49-AA3D-2E4EBBB4B541}" type="datetimeFigureOut">
               <a:rPr lang="en-US" smtClean="0"/>
-              <a:t>4/24/23</a:t>
+              <a:t>4/24/2023</a:t>
             </a:fld>
             <a:endParaRPr lang="en-US"/>
           </a:p>
@@ -2481,7 +2590,7 @@
           <a:p>
             <a:fld id="{17E1FF6A-9A55-7A49-AA3D-2E4EBBB4B541}" type="datetimeFigureOut">
               <a:rPr lang="en-US" smtClean="0"/>
-              <a:t>4/24/23</a:t>
+              <a:t>4/24/2023</a:t>
             </a:fld>
             <a:endParaRPr lang="en-US"/>
           </a:p>
@@ -2738,7 +2847,7 @@
           <a:p>
             <a:fld id="{17E1FF6A-9A55-7A49-AA3D-2E4EBBB4B541}" type="datetimeFigureOut">
               <a:rPr lang="en-US" smtClean="0"/>
-              <a:t>4/24/23</a:t>
+              <a:t>4/24/2023</a:t>
             </a:fld>
             <a:endParaRPr lang="en-US"/>
           </a:p>
@@ -2951,7 +3060,7 @@
           <a:p>
             <a:fld id="{81B1FA28-4A1F-40C5-8B9A-7CF7657742B4}" type="datetimeFigureOut">
               <a:rPr lang="en-US" smtClean="0"/>
-              <a:t>4/24/23</a:t>
+              <a:t>4/24/2023</a:t>
             </a:fld>
             <a:endParaRPr lang="en-US" dirty="0"/>
           </a:p>
@@ -3390,6 +3499,42 @@
           <a:chExt cx="0" cy="0"/>
         </a:xfrm>
       </p:grpSpPr>
+      <p:pic>
+        <p:nvPicPr>
+          <p:cNvPr id="28" name="Picture 27" descr="A picture containing hanger, cookie cutter&#10;&#10;Description automatically generated">
+            <a:extLst>
+              <a:ext uri="{FF2B5EF4-FFF2-40B4-BE49-F238E27FC236}">
+                <a16:creationId xmlns:a16="http://schemas.microsoft.com/office/drawing/2014/main" id="{7D254BEF-2465-85E2-3B3D-EDF31AFD49D0}"/>
+              </a:ext>
+            </a:extLst>
+          </p:cNvPr>
+          <p:cNvPicPr>
+            <a:picLocks noChangeAspect="1"/>
+          </p:cNvPicPr>
+          <p:nvPr/>
+        </p:nvPicPr>
+        <p:blipFill>
+          <a:blip r:embed="rId2">
+            <a:extLst>
+              <a:ext uri="{28A0092B-C50C-407E-A947-70E740481C1C}">
+                <a14:useLocalDpi xmlns:a14="http://schemas.microsoft.com/office/drawing/2010/main" val="0"/>
+              </a:ext>
+            </a:extLst>
+          </a:blip>
+          <a:stretch>
+            <a:fillRect/>
+          </a:stretch>
+        </p:blipFill>
+        <p:spPr>
+          <a:xfrm>
+            <a:off x="0" y="0"/>
+            <a:ext cx="38404799" cy="38430200"/>
+          </a:xfrm>
+          <a:prstGeom prst="rect">
+            <a:avLst/>
+          </a:prstGeom>
+        </p:spPr>
+      </p:pic>
       <p:sp>
         <p:nvSpPr>
           <p:cNvPr id="4" name="TextBox 3"/>
@@ -4000,64 +4145,358 @@
           </a:p>
         </p:txBody>
       </p:sp>
-      <p:sp>
-        <p:nvSpPr>
-          <p:cNvPr id="19" name="Rectangle 18"/>
-          <p:cNvSpPr/>
-          <p:nvPr/>
-        </p:nvSpPr>
-        <p:spPr>
-          <a:xfrm>
-            <a:off x="12685632" y="10744230"/>
-            <a:ext cx="13366045" cy="10135626"/>
-          </a:xfrm>
-          <a:prstGeom prst="rect">
-            <a:avLst/>
-          </a:prstGeom>
-          <a:solidFill>
-            <a:schemeClr val="bg1"/>
-          </a:solidFill>
-          <a:ln w="6350">
-            <a:solidFill>
-              <a:schemeClr val="tx1"/>
-            </a:solidFill>
-          </a:ln>
-        </p:spPr>
-        <p:style>
-          <a:lnRef idx="2">
-            <a:schemeClr val="accent1">
-              <a:shade val="50000"/>
-            </a:schemeClr>
-          </a:lnRef>
-          <a:fillRef idx="1">
-            <a:schemeClr val="accent1"/>
-          </a:fillRef>
-          <a:effectRef idx="0">
-            <a:schemeClr val="accent1"/>
-          </a:effectRef>
-          <a:fontRef idx="minor">
-            <a:schemeClr val="lt1"/>
-          </a:fontRef>
-        </p:style>
-        <p:txBody>
-          <a:bodyPr rtlCol="0" anchor="t"/>
-          <a:lstStyle/>
-          <a:p>
-            <a:pPr defTabSz="3511068"/>
-            <a:r>
-              <a:rPr lang="en-US" sz="4400" b="1" dirty="0">
-                <a:solidFill>
-                  <a:prstClr val="black"/>
-                </a:solidFill>
-                <a:latin typeface="Avenir Book" charset="0"/>
-                <a:ea typeface="Avenir Book" charset="0"/>
-                <a:cs typeface="Avenir Book" charset="0"/>
-              </a:rPr>
-              <a:t>Figure 1</a:t>
-            </a:r>
-          </a:p>
-        </p:txBody>
-      </p:sp>
+      <mc:AlternateContent xmlns:mc="http://schemas.openxmlformats.org/markup-compatibility/2006">
+        <mc:Choice xmlns:a14="http://schemas.microsoft.com/office/drawing/2010/main" Requires="a14">
+          <p:sp>
+            <p:nvSpPr>
+              <p:cNvPr id="19" name="Rectangle 18"/>
+              <p:cNvSpPr/>
+              <p:nvPr/>
+            </p:nvSpPr>
+            <p:spPr>
+              <a:xfrm>
+                <a:off x="12735609" y="10648866"/>
+                <a:ext cx="13261293" cy="10135626"/>
+              </a:xfrm>
+              <a:prstGeom prst="rect">
+                <a:avLst/>
+              </a:prstGeom>
+              <a:noFill/>
+              <a:ln w="6350">
+                <a:noFill/>
+              </a:ln>
+            </p:spPr>
+            <p:style>
+              <a:lnRef idx="2">
+                <a:schemeClr val="accent1">
+                  <a:shade val="50000"/>
+                </a:schemeClr>
+              </a:lnRef>
+              <a:fillRef idx="1">
+                <a:schemeClr val="accent1"/>
+              </a:fillRef>
+              <a:effectRef idx="0">
+                <a:schemeClr val="accent1"/>
+              </a:effectRef>
+              <a:fontRef idx="minor">
+                <a:schemeClr val="lt1"/>
+              </a:fontRef>
+            </p:style>
+            <p:txBody>
+              <a:bodyPr rtlCol="0" anchor="t"/>
+              <a:lstStyle/>
+              <a:p>
+                <a:pPr defTabSz="3511068"/>
+                <a:r>
+                  <a:rPr lang="en-US" sz="4400" b="1" dirty="0">
+                    <a:solidFill>
+                      <a:prstClr val="black"/>
+                    </a:solidFill>
+                    <a:latin typeface="Avenir Book" charset="0"/>
+                    <a:ea typeface="Avenir Book" charset="0"/>
+                    <a:cs typeface="Avenir Book" charset="0"/>
+                  </a:rPr>
+                  <a:t>Figures</a:t>
+                </a:r>
+              </a:p>
+              <a:p>
+                <a:pPr defTabSz="3511068"/>
+                <a:endParaRPr lang="en-US" sz="4400" b="1" dirty="0">
+                  <a:solidFill>
+                    <a:prstClr val="black"/>
+                  </a:solidFill>
+                  <a:latin typeface="Avenir Book" charset="0"/>
+                  <a:ea typeface="Avenir Book" charset="0"/>
+                  <a:cs typeface="Avenir Book" charset="0"/>
+                </a:endParaRPr>
+              </a:p>
+              <a:p>
+                <a:pPr defTabSz="3511068"/>
+                <a:endParaRPr lang="en-US" sz="4400" b="1" dirty="0">
+                  <a:solidFill>
+                    <a:prstClr val="black"/>
+                  </a:solidFill>
+                  <a:latin typeface="Avenir Book" charset="0"/>
+                  <a:ea typeface="Avenir Book" charset="0"/>
+                  <a:cs typeface="Avenir Book" charset="0"/>
+                </a:endParaRPr>
+              </a:p>
+              <a:p>
+                <a:pPr defTabSz="3511068"/>
+                <a:endParaRPr lang="en-US" sz="4400" b="1" dirty="0">
+                  <a:solidFill>
+                    <a:prstClr val="black"/>
+                  </a:solidFill>
+                  <a:latin typeface="Avenir Book" charset="0"/>
+                  <a:ea typeface="Avenir Book" charset="0"/>
+                  <a:cs typeface="Avenir Book" charset="0"/>
+                </a:endParaRPr>
+              </a:p>
+              <a:p>
+                <a:pPr defTabSz="3511068"/>
+                <a:endParaRPr lang="en-US" sz="4400" b="1" dirty="0">
+                  <a:solidFill>
+                    <a:prstClr val="black"/>
+                  </a:solidFill>
+                  <a:latin typeface="Avenir Book" charset="0"/>
+                  <a:ea typeface="Avenir Book" charset="0"/>
+                  <a:cs typeface="Avenir Book" charset="0"/>
+                </a:endParaRPr>
+              </a:p>
+              <a:p>
+                <a:pPr defTabSz="3511068"/>
+                <a:endParaRPr lang="en-US" sz="4400" b="1" dirty="0">
+                  <a:solidFill>
+                    <a:prstClr val="black"/>
+                  </a:solidFill>
+                  <a:latin typeface="Avenir Book" charset="0"/>
+                  <a:ea typeface="Avenir Book" charset="0"/>
+                  <a:cs typeface="Avenir Book" charset="0"/>
+                </a:endParaRPr>
+              </a:p>
+              <a:p>
+                <a:pPr defTabSz="3511068"/>
+                <a:endParaRPr lang="en-US" sz="4400" b="1" dirty="0">
+                  <a:solidFill>
+                    <a:prstClr val="black"/>
+                  </a:solidFill>
+                  <a:latin typeface="Avenir Book" charset="0"/>
+                  <a:ea typeface="Avenir Book" charset="0"/>
+                  <a:cs typeface="Avenir Book" charset="0"/>
+                </a:endParaRPr>
+              </a:p>
+              <a:p>
+                <a:pPr defTabSz="3511068"/>
+                <a:endParaRPr lang="en-US" sz="4400" b="1" dirty="0">
+                  <a:solidFill>
+                    <a:prstClr val="black"/>
+                  </a:solidFill>
+                  <a:latin typeface="Avenir Book" charset="0"/>
+                  <a:ea typeface="Avenir Book" charset="0"/>
+                  <a:cs typeface="Avenir Book" charset="0"/>
+                </a:endParaRPr>
+              </a:p>
+              <a:p>
+                <a:pPr defTabSz="3511068"/>
+                <a:endParaRPr lang="en-US" sz="4400" b="1" dirty="0">
+                  <a:solidFill>
+                    <a:prstClr val="black"/>
+                  </a:solidFill>
+                  <a:latin typeface="Avenir Book" charset="0"/>
+                  <a:ea typeface="Avenir Book" charset="0"/>
+                  <a:cs typeface="Avenir Book" charset="0"/>
+                </a:endParaRPr>
+              </a:p>
+              <a:p>
+                <a:pPr defTabSz="3511068"/>
+                <a:endParaRPr lang="en-US" sz="4400" b="1" dirty="0">
+                  <a:solidFill>
+                    <a:prstClr val="black"/>
+                  </a:solidFill>
+                  <a:latin typeface="Avenir Book" charset="0"/>
+                  <a:ea typeface="Avenir Book" charset="0"/>
+                  <a:cs typeface="Avenir Book" charset="0"/>
+                </a:endParaRPr>
+              </a:p>
+              <a:p>
+                <a:pPr defTabSz="3511068"/>
+                <a:endParaRPr lang="en-US" sz="4400" b="1" dirty="0">
+                  <a:solidFill>
+                    <a:prstClr val="black"/>
+                  </a:solidFill>
+                  <a:latin typeface="Avenir Book" charset="0"/>
+                  <a:ea typeface="Avenir Book" charset="0"/>
+                  <a:cs typeface="Avenir Book" charset="0"/>
+                </a:endParaRPr>
+              </a:p>
+              <a:p>
+                <a:pPr algn="ctr" defTabSz="3511068"/>
+                <a:endParaRPr lang="en-US" sz="2000" i="1" dirty="0">
+                  <a:solidFill>
+                    <a:prstClr val="black"/>
+                  </a:solidFill>
+                  <a:latin typeface="Avenir Book" charset="0"/>
+                  <a:ea typeface="Avenir Book" charset="0"/>
+                  <a:cs typeface="Avenir Book" charset="0"/>
+                </a:endParaRPr>
+              </a:p>
+              <a:p>
+                <a:pPr algn="ctr" defTabSz="3511068"/>
+                <a:r>
+                  <a:rPr lang="en-US" sz="2000" i="1" dirty="0">
+                    <a:solidFill>
+                      <a:prstClr val="black"/>
+                    </a:solidFill>
+                    <a:latin typeface="Avenir Book" charset="0"/>
+                    <a:ea typeface="Avenir Book" charset="0"/>
+                    <a:cs typeface="Avenir Book" charset="0"/>
+                  </a:rPr>
+                  <a:t>Figure 1: This visualization shows a comparison of species richness (y-axis) and canopy coverage (x-axis). The three sites shown, in differing colors, compare the coverage and the species richness by year. The pattern shows that those sites with more canopy cover have a higher richness in aquatic macro-invertebrates (</a:t>
+                </a:r>
+                <a14:m>
+                  <m:oMath xmlns:m="http://schemas.openxmlformats.org/officeDocument/2006/math">
+                    <m:sSup>
+                      <m:sSupPr>
+                        <m:ctrlPr>
+                          <a:rPr lang="en-US" sz="2000" b="0" i="1" smtClean="0">
+                            <a:solidFill>
+                              <a:prstClr val="black"/>
+                            </a:solidFill>
+                            <a:latin typeface="Cambria Math" panose="02040503050406030204" pitchFamily="18" charset="0"/>
+                            <a:ea typeface="Avenir Book" charset="0"/>
+                            <a:cs typeface="Avenir Book" charset="0"/>
+                          </a:rPr>
+                        </m:ctrlPr>
+                      </m:sSupPr>
+                      <m:e>
+                        <m:r>
+                          <a:rPr lang="en-US" sz="2000" b="0" i="1" smtClean="0">
+                            <a:solidFill>
+                              <a:prstClr val="black"/>
+                            </a:solidFill>
+                            <a:latin typeface="Cambria Math" panose="02040503050406030204" pitchFamily="18" charset="0"/>
+                            <a:ea typeface="Avenir Book" charset="0"/>
+                            <a:cs typeface="Avenir Book" charset="0"/>
+                          </a:rPr>
+                          <m:t>𝑅</m:t>
+                        </m:r>
+                      </m:e>
+                      <m:sup>
+                        <m:r>
+                          <a:rPr lang="en-US" sz="2000" b="0" i="1" smtClean="0">
+                            <a:solidFill>
+                              <a:prstClr val="black"/>
+                            </a:solidFill>
+                            <a:latin typeface="Cambria Math" panose="02040503050406030204" pitchFamily="18" charset="0"/>
+                            <a:ea typeface="Avenir Book" charset="0"/>
+                            <a:cs typeface="Avenir Book" charset="0"/>
+                          </a:rPr>
+                          <m:t>2</m:t>
+                        </m:r>
+                      </m:sup>
+                    </m:sSup>
+                    <m:r>
+                      <a:rPr lang="en-US" sz="2000" b="0" i="1" smtClean="0">
+                        <a:solidFill>
+                          <a:prstClr val="black"/>
+                        </a:solidFill>
+                        <a:latin typeface="Cambria Math" panose="02040503050406030204" pitchFamily="18" charset="0"/>
+                        <a:ea typeface="Avenir Book" charset="0"/>
+                        <a:cs typeface="Avenir Book" charset="0"/>
+                      </a:rPr>
+                      <m:t>=0.15, </m:t>
+                    </m:r>
+                    <m:r>
+                      <a:rPr lang="en-US" sz="2000" b="0" i="1" smtClean="0">
+                        <a:solidFill>
+                          <a:prstClr val="black"/>
+                        </a:solidFill>
+                        <a:latin typeface="Cambria Math" panose="02040503050406030204" pitchFamily="18" charset="0"/>
+                        <a:ea typeface="Avenir Book" charset="0"/>
+                        <a:cs typeface="Avenir Book" charset="0"/>
+                      </a:rPr>
+                      <m:t>𝑡</m:t>
+                    </m:r>
+                    <m:r>
+                      <a:rPr lang="en-US" sz="2000" b="0" i="1" smtClean="0">
+                        <a:solidFill>
+                          <a:prstClr val="black"/>
+                        </a:solidFill>
+                        <a:latin typeface="Cambria Math" panose="02040503050406030204" pitchFamily="18" charset="0"/>
+                        <a:ea typeface="Avenir Book" charset="0"/>
+                        <a:cs typeface="Avenir Book" charset="0"/>
+                      </a:rPr>
+                      <m:t>=1.13, </m:t>
+                    </m:r>
+                    <m:r>
+                      <a:rPr lang="en-US" sz="2000" b="0" i="1" smtClean="0">
+                        <a:solidFill>
+                          <a:prstClr val="black"/>
+                        </a:solidFill>
+                        <a:latin typeface="Cambria Math" panose="02040503050406030204" pitchFamily="18" charset="0"/>
+                        <a:ea typeface="Avenir Book" charset="0"/>
+                        <a:cs typeface="Avenir Book" charset="0"/>
+                      </a:rPr>
+                      <m:t>𝑝</m:t>
+                    </m:r>
+                    <m:r>
+                      <a:rPr lang="en-US" sz="2000" b="0" i="1" smtClean="0">
+                        <a:solidFill>
+                          <a:prstClr val="black"/>
+                        </a:solidFill>
+                        <a:latin typeface="Cambria Math" panose="02040503050406030204" pitchFamily="18" charset="0"/>
+                        <a:ea typeface="Avenir Book" charset="0"/>
+                        <a:cs typeface="Avenir Book" charset="0"/>
+                      </a:rPr>
+                      <m:t>=0.3</m:t>
+                    </m:r>
+                  </m:oMath>
+                </a14:m>
+                <a:r>
+                  <a:rPr lang="fr-FR" sz="2000" i="1" dirty="0">
+                    <a:solidFill>
+                      <a:prstClr val="black"/>
+                    </a:solidFill>
+                    <a:latin typeface="Avenir Book" charset="0"/>
+                    <a:ea typeface="Avenir Book" charset="0"/>
+                    <a:cs typeface="Avenir Book" charset="0"/>
+                  </a:rPr>
+                  <a:t>).</a:t>
+                </a:r>
+                <a:endParaRPr lang="en-US" sz="4400" dirty="0">
+                  <a:solidFill>
+                    <a:prstClr val="black"/>
+                  </a:solidFill>
+                  <a:latin typeface="Avenir Book" charset="0"/>
+                  <a:ea typeface="Avenir Book" charset="0"/>
+                  <a:cs typeface="Avenir Book" charset="0"/>
+                </a:endParaRPr>
+              </a:p>
+            </p:txBody>
+          </p:sp>
+        </mc:Choice>
+        <mc:Fallback>
+          <p:sp>
+            <p:nvSpPr>
+              <p:cNvPr id="19" name="Rectangle 18"/>
+              <p:cNvSpPr>
+                <a:spLocks noRot="1" noChangeAspect="1" noMove="1" noResize="1" noEditPoints="1" noAdjustHandles="1" noChangeArrowheads="1" noChangeShapeType="1" noTextEdit="1"/>
+              </p:cNvSpPr>
+              <p:nvPr/>
+            </p:nvSpPr>
+            <p:spPr>
+              <a:xfrm>
+                <a:off x="12735609" y="10648866"/>
+                <a:ext cx="13261293" cy="10135626"/>
+              </a:xfrm>
+              <a:prstGeom prst="rect">
+                <a:avLst/>
+              </a:prstGeom>
+              <a:blipFill>
+                <a:blip r:embed="rId3"/>
+                <a:stretch>
+                  <a:fillRect l="-1838" t="-1323"/>
+                </a:stretch>
+              </a:blipFill>
+              <a:ln w="6350">
+                <a:noFill/>
+              </a:ln>
+            </p:spPr>
+            <p:txBody>
+              <a:bodyPr/>
+              <a:lstStyle/>
+              <a:p>
+                <a:r>
+                  <a:rPr lang="en-US">
+                    <a:noFill/>
+                  </a:rPr>
+                  <a:t> </a:t>
+                </a:r>
+              </a:p>
+            </p:txBody>
+          </p:sp>
+        </mc:Fallback>
+      </mc:AlternateContent>
       <p:pic>
         <p:nvPicPr>
           <p:cNvPr id="25" name="Picture 24"/>
@@ -4067,7 +4506,7 @@
           <p:nvPr/>
         </p:nvPicPr>
         <p:blipFill>
-          <a:blip r:embed="rId2" cstate="print">
+          <a:blip r:embed="rId4" cstate="print">
             <a:extLst>
               <a:ext uri="{28A0092B-C50C-407E-A947-70E740481C1C}">
                 <a14:useLocalDpi xmlns:a14="http://schemas.microsoft.com/office/drawing/2010/main" val="0"/>
@@ -4249,36 +4688,6 @@
           </a:p>
         </p:txBody>
       </p:sp>
-      <p:pic>
-        <p:nvPicPr>
-          <p:cNvPr id="7" name="Picture 6">
-            <a:extLst>
-              <a:ext uri="{FF2B5EF4-FFF2-40B4-BE49-F238E27FC236}">
-                <a16:creationId xmlns:a16="http://schemas.microsoft.com/office/drawing/2014/main" id="{B6F3872D-AFCF-76F9-B4EC-DED08D7B5FC8}"/>
-              </a:ext>
-            </a:extLst>
-          </p:cNvPr>
-          <p:cNvPicPr>
-            <a:picLocks noChangeAspect="1"/>
-          </p:cNvPicPr>
-          <p:nvPr/>
-        </p:nvPicPr>
-        <p:blipFill>
-          <a:blip r:embed="rId3"/>
-          <a:stretch>
-            <a:fillRect/>
-          </a:stretch>
-        </p:blipFill>
-        <p:spPr>
-          <a:xfrm>
-            <a:off x="13231219" y="12466365"/>
-            <a:ext cx="11942362" cy="7370143"/>
-          </a:xfrm>
-          <a:prstGeom prst="rect">
-            <a:avLst/>
-          </a:prstGeom>
-        </p:spPr>
-      </p:pic>
       <p:sp>
         <p:nvSpPr>
           <p:cNvPr id="3" name="Rectangle 2">
@@ -4444,7 +4853,7 @@
           <a:p>
             <a:pPr defTabSz="3511068"/>
             <a:r>
-              <a:rPr lang="en-US" sz="4400" b="1" dirty="0">
+              <a:rPr lang="en-US" sz="4400" b="1">
                 <a:solidFill>
                   <a:prstClr val="black"/>
                 </a:solidFill>
@@ -4452,8 +4861,16 @@
                 <a:ea typeface="Avenir Book" charset="0"/>
                 <a:cs typeface="Avenir Book" charset="0"/>
               </a:rPr>
-              <a:t>hi</a:t>
-            </a:r>
+              <a:t>Hi </a:t>
+            </a:r>
+            <a:endParaRPr lang="en-US" sz="4400" b="1" dirty="0">
+              <a:solidFill>
+                <a:prstClr val="black"/>
+              </a:solidFill>
+              <a:latin typeface="Avenir Book" charset="0"/>
+              <a:ea typeface="Avenir Book" charset="0"/>
+              <a:cs typeface="Avenir Book" charset="0"/>
+            </a:endParaRPr>
           </a:p>
         </p:txBody>
       </p:sp>
@@ -4523,70 +4940,6 @@
       </p:sp>
       <p:sp>
         <p:nvSpPr>
-          <p:cNvPr id="10" name="Rectangle 9">
-            <a:extLst>
-              <a:ext uri="{FF2B5EF4-FFF2-40B4-BE49-F238E27FC236}">
-                <a16:creationId xmlns:a16="http://schemas.microsoft.com/office/drawing/2014/main" id="{041A92AD-E424-C51F-8A61-F39A4ABFB6C3}"/>
-              </a:ext>
-            </a:extLst>
-          </p:cNvPr>
-          <p:cNvSpPr/>
-          <p:nvPr/>
-        </p:nvSpPr>
-        <p:spPr>
-          <a:xfrm>
-            <a:off x="12685632" y="21992938"/>
-            <a:ext cx="13366045" cy="10135626"/>
-          </a:xfrm>
-          <a:prstGeom prst="rect">
-            <a:avLst/>
-          </a:prstGeom>
-          <a:solidFill>
-            <a:schemeClr val="bg1"/>
-          </a:solidFill>
-          <a:ln w="6350">
-            <a:solidFill>
-              <a:schemeClr val="tx1"/>
-            </a:solidFill>
-          </a:ln>
-        </p:spPr>
-        <p:style>
-          <a:lnRef idx="2">
-            <a:schemeClr val="accent1">
-              <a:shade val="50000"/>
-            </a:schemeClr>
-          </a:lnRef>
-          <a:fillRef idx="1">
-            <a:schemeClr val="accent1"/>
-          </a:fillRef>
-          <a:effectRef idx="0">
-            <a:schemeClr val="accent1"/>
-          </a:effectRef>
-          <a:fontRef idx="minor">
-            <a:schemeClr val="lt1"/>
-          </a:fontRef>
-        </p:style>
-        <p:txBody>
-          <a:bodyPr rtlCol="0" anchor="t"/>
-          <a:lstStyle/>
-          <a:p>
-            <a:pPr defTabSz="3511068"/>
-            <a:r>
-              <a:rPr lang="en-US" sz="4400" b="1" dirty="0">
-                <a:solidFill>
-                  <a:prstClr val="black"/>
-                </a:solidFill>
-                <a:latin typeface="Avenir Book" charset="0"/>
-                <a:ea typeface="Avenir Book" charset="0"/>
-                <a:cs typeface="Avenir Book" charset="0"/>
-              </a:rPr>
-              <a:t>Figure 1</a:t>
-            </a:r>
-          </a:p>
-        </p:txBody>
-      </p:sp>
-      <p:sp>
-        <p:nvSpPr>
           <p:cNvPr id="6" name="TextBox 5">
             <a:extLst>
               <a:ext uri="{FF2B5EF4-FFF2-40B4-BE49-F238E27FC236}">
@@ -4731,7 +5084,7 @@
           <p:nvPr/>
         </p:nvPicPr>
         <p:blipFill>
-          <a:blip r:embed="rId4">
+          <a:blip r:embed="rId5">
             <a:extLst>
               <a:ext uri="{28A0092B-C50C-407E-A947-70E740481C1C}">
                 <a14:useLocalDpi xmlns:a14="http://schemas.microsoft.com/office/drawing/2010/main" val="0"/>
@@ -4778,7 +5131,7 @@
           <p:nvPr/>
         </p:nvPicPr>
         <p:blipFill>
-          <a:blip r:embed="rId5">
+          <a:blip r:embed="rId6">
             <a:extLst>
               <a:ext uri="{28A0092B-C50C-407E-A947-70E740481C1C}">
                 <a14:useLocalDpi xmlns:a14="http://schemas.microsoft.com/office/drawing/2010/main" val="0"/>
@@ -5011,6 +5364,419 @@
           </a:p>
           <a:p>
             <a:endParaRPr lang="en-US" dirty="0"/>
+          </a:p>
+        </p:txBody>
+      </p:sp>
+      <p:pic>
+        <p:nvPicPr>
+          <p:cNvPr id="13" name="Picture 12" descr="Chart&#10;&#10;Description automatically generated">
+            <a:extLst>
+              <a:ext uri="{FF2B5EF4-FFF2-40B4-BE49-F238E27FC236}">
+                <a16:creationId xmlns:a16="http://schemas.microsoft.com/office/drawing/2014/main" id="{1A8E12F4-B195-F3ED-B486-1288DA31A6F3}"/>
+              </a:ext>
+            </a:extLst>
+          </p:cNvPr>
+          <p:cNvPicPr>
+            <a:picLocks noChangeAspect="1"/>
+          </p:cNvPicPr>
+          <p:nvPr/>
+        </p:nvPicPr>
+        <p:blipFill>
+          <a:blip r:embed="rId7">
+            <a:extLst>
+              <a:ext uri="{28A0092B-C50C-407E-A947-70E740481C1C}">
+                <a14:useLocalDpi xmlns:a14="http://schemas.microsoft.com/office/drawing/2010/main" val="0"/>
+              </a:ext>
+            </a:extLst>
+          </a:blip>
+          <a:stretch>
+            <a:fillRect/>
+          </a:stretch>
+        </p:blipFill>
+        <p:spPr>
+          <a:xfrm>
+            <a:off x="13792153" y="11385067"/>
+            <a:ext cx="10515694" cy="6498867"/>
+          </a:xfrm>
+          <a:prstGeom prst="rect">
+            <a:avLst/>
+          </a:prstGeom>
+        </p:spPr>
+      </p:pic>
+      <p:pic>
+        <p:nvPicPr>
+          <p:cNvPr id="21" name="Picture 20" descr="Chart, bar chart&#10;&#10;Description automatically generated">
+            <a:extLst>
+              <a:ext uri="{FF2B5EF4-FFF2-40B4-BE49-F238E27FC236}">
+                <a16:creationId xmlns:a16="http://schemas.microsoft.com/office/drawing/2014/main" id="{14705122-2EF9-4F84-7661-1121BFDE1ED6}"/>
+              </a:ext>
+            </a:extLst>
+          </p:cNvPr>
+          <p:cNvPicPr>
+            <a:picLocks noChangeAspect="1"/>
+          </p:cNvPicPr>
+          <p:nvPr/>
+        </p:nvPicPr>
+        <p:blipFill>
+          <a:blip r:embed="rId8">
+            <a:extLst>
+              <a:ext uri="{28A0092B-C50C-407E-A947-70E740481C1C}">
+                <a14:useLocalDpi xmlns:a14="http://schemas.microsoft.com/office/drawing/2010/main" val="0"/>
+              </a:ext>
+            </a:extLst>
+          </a:blip>
+          <a:stretch>
+            <a:fillRect/>
+          </a:stretch>
+        </p:blipFill>
+        <p:spPr>
+          <a:xfrm>
+            <a:off x="13006443" y="21501325"/>
+            <a:ext cx="6569009" cy="4160881"/>
+          </a:xfrm>
+          <a:prstGeom prst="rect">
+            <a:avLst/>
+          </a:prstGeom>
+        </p:spPr>
+      </p:pic>
+      <p:pic>
+        <p:nvPicPr>
+          <p:cNvPr id="24" name="Picture 23" descr="Chart, bar chart&#10;&#10;Description automatically generated">
+            <a:extLst>
+              <a:ext uri="{FF2B5EF4-FFF2-40B4-BE49-F238E27FC236}">
+                <a16:creationId xmlns:a16="http://schemas.microsoft.com/office/drawing/2014/main" id="{6F027826-D590-3FB1-E4D9-6967DA5686B1}"/>
+              </a:ext>
+            </a:extLst>
+          </p:cNvPr>
+          <p:cNvPicPr>
+            <a:picLocks noChangeAspect="1"/>
+          </p:cNvPicPr>
+          <p:nvPr/>
+        </p:nvPicPr>
+        <p:blipFill>
+          <a:blip r:embed="rId9">
+            <a:extLst>
+              <a:ext uri="{28A0092B-C50C-407E-A947-70E740481C1C}">
+                <a14:useLocalDpi xmlns:a14="http://schemas.microsoft.com/office/drawing/2010/main" val="0"/>
+              </a:ext>
+            </a:extLst>
+          </a:blip>
+          <a:stretch>
+            <a:fillRect/>
+          </a:stretch>
+        </p:blipFill>
+        <p:spPr>
+          <a:xfrm>
+            <a:off x="13025494" y="27099765"/>
+            <a:ext cx="6530906" cy="4122777"/>
+          </a:xfrm>
+          <a:prstGeom prst="rect">
+            <a:avLst/>
+          </a:prstGeom>
+        </p:spPr>
+      </p:pic>
+      <p:sp>
+        <p:nvSpPr>
+          <p:cNvPr id="29" name="Rectangle 28">
+            <a:extLst>
+              <a:ext uri="{FF2B5EF4-FFF2-40B4-BE49-F238E27FC236}">
+                <a16:creationId xmlns:a16="http://schemas.microsoft.com/office/drawing/2014/main" id="{C0342443-3EFE-323D-98FE-0D7B60834B58}"/>
+              </a:ext>
+            </a:extLst>
+          </p:cNvPr>
+          <p:cNvSpPr/>
+          <p:nvPr/>
+        </p:nvSpPr>
+        <p:spPr>
+          <a:xfrm>
+            <a:off x="19724750" y="21520693"/>
+            <a:ext cx="6345813" cy="10135626"/>
+          </a:xfrm>
+          <a:prstGeom prst="rect">
+            <a:avLst/>
+          </a:prstGeom>
+          <a:noFill/>
+          <a:ln w="6350">
+            <a:noFill/>
+          </a:ln>
+        </p:spPr>
+        <p:style>
+          <a:lnRef idx="2">
+            <a:schemeClr val="accent1">
+              <a:shade val="50000"/>
+            </a:schemeClr>
+          </a:lnRef>
+          <a:fillRef idx="1">
+            <a:schemeClr val="accent1"/>
+          </a:fillRef>
+          <a:effectRef idx="0">
+            <a:schemeClr val="accent1"/>
+          </a:effectRef>
+          <a:fontRef idx="minor">
+            <a:schemeClr val="lt1"/>
+          </a:fontRef>
+        </p:style>
+        <p:txBody>
+          <a:bodyPr rtlCol="0" anchor="t"/>
+          <a:lstStyle/>
+          <a:p>
+            <a:pPr algn="ctr" defTabSz="3511068"/>
+            <a:endParaRPr lang="en-US" sz="2000" i="1" dirty="0">
+              <a:solidFill>
+                <a:prstClr val="black"/>
+              </a:solidFill>
+              <a:latin typeface="Avenir Book" charset="0"/>
+              <a:ea typeface="Avenir Book" charset="0"/>
+              <a:cs typeface="Avenir Book" charset="0"/>
+            </a:endParaRPr>
+          </a:p>
+          <a:p>
+            <a:pPr algn="ctr" defTabSz="3511068"/>
+            <a:endParaRPr lang="en-US" sz="2000" i="1" dirty="0">
+              <a:solidFill>
+                <a:prstClr val="black"/>
+              </a:solidFill>
+              <a:latin typeface="Avenir Book" charset="0"/>
+              <a:ea typeface="Avenir Book" charset="0"/>
+              <a:cs typeface="Avenir Book" charset="0"/>
+            </a:endParaRPr>
+          </a:p>
+          <a:p>
+            <a:pPr algn="ctr" defTabSz="3511068"/>
+            <a:endParaRPr lang="en-US" sz="2000" i="1" dirty="0">
+              <a:solidFill>
+                <a:prstClr val="black"/>
+              </a:solidFill>
+              <a:latin typeface="Avenir Book" charset="0"/>
+              <a:ea typeface="Avenir Book" charset="0"/>
+              <a:cs typeface="Avenir Book" charset="0"/>
+            </a:endParaRPr>
+          </a:p>
+          <a:p>
+            <a:pPr algn="ctr" defTabSz="3511068"/>
+            <a:r>
+              <a:rPr lang="en-US" sz="2000" i="1" dirty="0">
+                <a:solidFill>
+                  <a:prstClr val="black"/>
+                </a:solidFill>
+                <a:latin typeface="Avenir Book" charset="0"/>
+                <a:ea typeface="Avenir Book" charset="0"/>
+                <a:cs typeface="Avenir Book" charset="0"/>
+              </a:rPr>
+              <a:t>Figure 2: A bar graph of average canopy cover (y-axis) grouped by site (x-axis) and year (bar color). Higher bars represent large amounts of average canopy cover where the Alaska site (OKSR) had very little to no tree cover. Not all sites had a 2017 or a 2021 recording, but all three sites had similar average percent canopy cover across all three years.</a:t>
+            </a:r>
+          </a:p>
+          <a:p>
+            <a:pPr algn="ctr" defTabSz="3511068"/>
+            <a:endParaRPr lang="en-US" sz="2000" i="1" dirty="0">
+              <a:solidFill>
+                <a:prstClr val="black"/>
+              </a:solidFill>
+              <a:latin typeface="Avenir Book" charset="0"/>
+              <a:ea typeface="Avenir Book" charset="0"/>
+              <a:cs typeface="Avenir Book" charset="0"/>
+            </a:endParaRPr>
+          </a:p>
+          <a:p>
+            <a:pPr algn="ctr" defTabSz="3511068"/>
+            <a:endParaRPr lang="en-US" sz="2000" i="1" dirty="0">
+              <a:solidFill>
+                <a:prstClr val="black"/>
+              </a:solidFill>
+              <a:latin typeface="Avenir Book" charset="0"/>
+              <a:ea typeface="Avenir Book" charset="0"/>
+              <a:cs typeface="Avenir Book" charset="0"/>
+            </a:endParaRPr>
+          </a:p>
+          <a:p>
+            <a:pPr algn="ctr" defTabSz="3511068"/>
+            <a:endParaRPr lang="en-US" sz="2000" i="1" dirty="0">
+              <a:solidFill>
+                <a:prstClr val="black"/>
+              </a:solidFill>
+              <a:latin typeface="Avenir Book" charset="0"/>
+              <a:ea typeface="Avenir Book" charset="0"/>
+              <a:cs typeface="Avenir Book" charset="0"/>
+            </a:endParaRPr>
+          </a:p>
+          <a:p>
+            <a:pPr algn="ctr" defTabSz="3511068"/>
+            <a:endParaRPr lang="en-US" sz="2000" i="1" dirty="0">
+              <a:solidFill>
+                <a:prstClr val="black"/>
+              </a:solidFill>
+              <a:latin typeface="Avenir Book" charset="0"/>
+              <a:ea typeface="Avenir Book" charset="0"/>
+              <a:cs typeface="Avenir Book" charset="0"/>
+            </a:endParaRPr>
+          </a:p>
+          <a:p>
+            <a:pPr algn="ctr" defTabSz="3511068"/>
+            <a:endParaRPr lang="en-US" sz="2000" i="1" dirty="0">
+              <a:solidFill>
+                <a:prstClr val="black"/>
+              </a:solidFill>
+              <a:latin typeface="Avenir Book" charset="0"/>
+              <a:ea typeface="Avenir Book" charset="0"/>
+              <a:cs typeface="Avenir Book" charset="0"/>
+            </a:endParaRPr>
+          </a:p>
+          <a:p>
+            <a:pPr algn="ctr" defTabSz="3511068"/>
+            <a:endParaRPr lang="en-US" sz="2000" i="1" dirty="0">
+              <a:solidFill>
+                <a:prstClr val="black"/>
+              </a:solidFill>
+              <a:latin typeface="Avenir Book" charset="0"/>
+              <a:ea typeface="Avenir Book" charset="0"/>
+              <a:cs typeface="Avenir Book" charset="0"/>
+            </a:endParaRPr>
+          </a:p>
+          <a:p>
+            <a:pPr algn="ctr" defTabSz="3511068"/>
+            <a:endParaRPr lang="en-US" sz="2000" i="1" dirty="0">
+              <a:solidFill>
+                <a:prstClr val="black"/>
+              </a:solidFill>
+              <a:latin typeface="Avenir Book" charset="0"/>
+              <a:ea typeface="Avenir Book" charset="0"/>
+              <a:cs typeface="Avenir Book" charset="0"/>
+            </a:endParaRPr>
+          </a:p>
+          <a:p>
+            <a:pPr algn="ctr" defTabSz="3511068"/>
+            <a:endParaRPr lang="en-US" sz="2000" i="1" dirty="0">
+              <a:solidFill>
+                <a:prstClr val="black"/>
+              </a:solidFill>
+              <a:latin typeface="Avenir Book" charset="0"/>
+              <a:ea typeface="Avenir Book" charset="0"/>
+              <a:cs typeface="Avenir Book" charset="0"/>
+            </a:endParaRPr>
+          </a:p>
+          <a:p>
+            <a:pPr algn="ctr" defTabSz="3511068"/>
+            <a:endParaRPr lang="en-US" sz="2000" i="1" dirty="0">
+              <a:solidFill>
+                <a:prstClr val="black"/>
+              </a:solidFill>
+              <a:latin typeface="Avenir Book" charset="0"/>
+              <a:ea typeface="Avenir Book" charset="0"/>
+              <a:cs typeface="Avenir Book" charset="0"/>
+            </a:endParaRPr>
+          </a:p>
+          <a:p>
+            <a:pPr algn="ctr" defTabSz="3511068"/>
+            <a:endParaRPr lang="en-US" sz="2000" i="1" dirty="0">
+              <a:solidFill>
+                <a:prstClr val="black"/>
+              </a:solidFill>
+              <a:latin typeface="Avenir Book" charset="0"/>
+              <a:ea typeface="Avenir Book" charset="0"/>
+              <a:cs typeface="Avenir Book" charset="0"/>
+            </a:endParaRPr>
+          </a:p>
+          <a:p>
+            <a:pPr algn="ctr" defTabSz="3511068"/>
+            <a:endParaRPr lang="en-US" sz="2000" i="1" dirty="0">
+              <a:solidFill>
+                <a:prstClr val="black"/>
+              </a:solidFill>
+              <a:latin typeface="Avenir Book" charset="0"/>
+              <a:ea typeface="Avenir Book" charset="0"/>
+              <a:cs typeface="Avenir Book" charset="0"/>
+            </a:endParaRPr>
+          </a:p>
+          <a:p>
+            <a:pPr algn="ctr" defTabSz="3511068"/>
+            <a:endParaRPr lang="en-US" sz="2000" i="1" dirty="0">
+              <a:solidFill>
+                <a:prstClr val="black"/>
+              </a:solidFill>
+              <a:latin typeface="Avenir Book" charset="0"/>
+              <a:ea typeface="Avenir Book" charset="0"/>
+              <a:cs typeface="Avenir Book" charset="0"/>
+            </a:endParaRPr>
+          </a:p>
+          <a:p>
+            <a:pPr algn="ctr" defTabSz="3511068"/>
+            <a:r>
+              <a:rPr lang="en-US" sz="2000" i="1" dirty="0">
+                <a:solidFill>
+                  <a:prstClr val="black"/>
+                </a:solidFill>
+                <a:latin typeface="Avenir Book" charset="0"/>
+                <a:ea typeface="Avenir Book" charset="0"/>
+                <a:cs typeface="Avenir Book" charset="0"/>
+              </a:rPr>
+              <a:t>Figure 3: On the x-axis of this figure, three sites are labeled and colored by year, and the y-axis is aquatic macroinvertebrate richness. Each color signifies the year the data was collected. The pattern shows that in Upper Big Creek (BIGC) there was an increase in richness, Mayfield Creek had a decrease in richness, and </a:t>
+            </a:r>
+            <a:r>
+              <a:rPr lang="en-US" sz="2000" i="1" dirty="0" err="1">
+                <a:solidFill>
+                  <a:prstClr val="black"/>
+                </a:solidFill>
+                <a:latin typeface="Avenir Book" charset="0"/>
+                <a:ea typeface="Avenir Book" charset="0"/>
+                <a:cs typeface="Avenir Book" charset="0"/>
+              </a:rPr>
+              <a:t>Oksrukuyik</a:t>
+            </a:r>
+            <a:r>
+              <a:rPr lang="en-US" sz="2000" i="1" dirty="0">
+                <a:solidFill>
+                  <a:prstClr val="black"/>
+                </a:solidFill>
+                <a:latin typeface="Avenir Book" charset="0"/>
+                <a:ea typeface="Avenir Book" charset="0"/>
+                <a:cs typeface="Avenir Book" charset="0"/>
+              </a:rPr>
+              <a:t> Creek had no change in richness.</a:t>
+            </a:r>
+          </a:p>
+          <a:p>
+            <a:pPr algn="ctr" defTabSz="3511068"/>
+            <a:endParaRPr lang="en-US" sz="2000" i="1" dirty="0">
+              <a:solidFill>
+                <a:prstClr val="black"/>
+              </a:solidFill>
+              <a:latin typeface="Avenir Book" charset="0"/>
+              <a:ea typeface="Avenir Book" charset="0"/>
+              <a:cs typeface="Avenir Book" charset="0"/>
+            </a:endParaRPr>
+          </a:p>
+          <a:p>
+            <a:pPr algn="ctr" defTabSz="3511068"/>
+            <a:endParaRPr lang="en-US" sz="2000" i="1" dirty="0">
+              <a:solidFill>
+                <a:prstClr val="black"/>
+              </a:solidFill>
+              <a:latin typeface="Avenir Book" charset="0"/>
+              <a:ea typeface="Avenir Book" charset="0"/>
+              <a:cs typeface="Avenir Book" charset="0"/>
+            </a:endParaRPr>
+          </a:p>
+          <a:p>
+            <a:pPr algn="ctr" defTabSz="3511068"/>
+            <a:endParaRPr lang="en-US" sz="2000" i="1" dirty="0">
+              <a:solidFill>
+                <a:prstClr val="black"/>
+              </a:solidFill>
+              <a:latin typeface="Avenir Book" charset="0"/>
+              <a:ea typeface="Avenir Book" charset="0"/>
+              <a:cs typeface="Avenir Book" charset="0"/>
+            </a:endParaRPr>
+          </a:p>
+          <a:p>
+            <a:pPr algn="ctr" defTabSz="3511068"/>
+            <a:endParaRPr lang="en-US" sz="4400" dirty="0">
+              <a:solidFill>
+                <a:prstClr val="black"/>
+              </a:solidFill>
+              <a:latin typeface="Avenir Book" charset="0"/>
+              <a:ea typeface="Avenir Book" charset="0"/>
+              <a:cs typeface="Avenir Book" charset="0"/>
+            </a:endParaRPr>
           </a:p>
         </p:txBody>
       </p:sp>
@@ -5550,6 +6316,15 @@
 </file>
 
 <file path=customXml/item1.xml><?xml version="1.0" encoding="utf-8"?>
+<?mso-contentType ?>
+<FormTemplates xmlns="http://schemas.microsoft.com/sharepoint/v3/contenttype/forms">
+  <Display>DocumentLibraryForm</Display>
+  <Edit>DocumentLibraryForm</Edit>
+  <New>DocumentLibraryForm</New>
+</FormTemplates>
+</file>
+
+<file path=customXml/item2.xml><?xml version="1.0" encoding="utf-8"?>
 <ct:contentTypeSchema xmlns:ct="http://schemas.microsoft.com/office/2006/metadata/contentType" xmlns:ma="http://schemas.microsoft.com/office/2006/metadata/properties/metaAttributes" ct:_="" ma:_="" ma:contentTypeName="Document" ma:contentTypeID="0x010100654CAF8486C9E84495C47CB17428612F" ma:contentTypeVersion="36" ma:contentTypeDescription="Create a new document." ma:contentTypeScope="" ma:versionID="d218fca90878da09470f9d9c6913f761">
   <xsd:schema xmlns:xsd="http://www.w3.org/2001/XMLSchema" xmlns:xs="http://www.w3.org/2001/XMLSchema" xmlns:p="http://schemas.microsoft.com/office/2006/metadata/properties" xmlns:ns1="http://schemas.microsoft.com/sharepoint/v3" xmlns:ns3="24a4780b-b9b8-490f-9267-7801a440b1c2" xmlns:ns4="6b544d46-9b2a-4003-bc91-8ec45b0e4a0d" targetNamespace="http://schemas.microsoft.com/office/2006/metadata/properties" ma:root="true" ma:fieldsID="62b2a6bbd8efe47c1646205a6fed2971" ns1:_="" ns3:_="" ns4:_="">
     <xsd:import namespace="http://schemas.microsoft.com/sharepoint/v3"/>
@@ -5983,15 +6758,6 @@
 </ct:contentTypeSchema>
 </file>
 
-<file path=customXml/item2.xml><?xml version="1.0" encoding="utf-8"?>
-<?mso-contentType ?>
-<FormTemplates xmlns="http://schemas.microsoft.com/sharepoint/v3/contenttype/forms">
-  <Display>DocumentLibraryForm</Display>
-  <Edit>DocumentLibraryForm</Edit>
-  <New>DocumentLibraryForm</New>
-</FormTemplates>
-</file>
-
 <file path=customXml/item3.xml><?xml version="1.0" encoding="utf-8"?>
 <p:properties xmlns:p="http://schemas.microsoft.com/office/2006/metadata/properties" xmlns:xsi="http://www.w3.org/2001/XMLSchema-instance" xmlns:pc="http://schemas.microsoft.com/office/infopath/2007/PartnerControls">
   <documentManagement>
@@ -6046,6 +6812,14 @@
 </file>
 
 <file path=customXml/itemProps1.xml><?xml version="1.0" encoding="utf-8"?>
+<ds:datastoreItem xmlns:ds="http://schemas.openxmlformats.org/officeDocument/2006/customXml" ds:itemID="{61FBE2F1-E3E5-4809-A97E-1E6B42890106}">
+  <ds:schemaRefs>
+    <ds:schemaRef ds:uri="http://schemas.microsoft.com/sharepoint/v3/contenttype/forms"/>
+  </ds:schemaRefs>
+</ds:datastoreItem>
+</file>
+
+<file path=customXml/itemProps2.xml><?xml version="1.0" encoding="utf-8"?>
 <ds:datastoreItem xmlns:ds="http://schemas.openxmlformats.org/officeDocument/2006/customXml" ds:itemID="{80469171-EA2F-47E3-8AA4-D53375A810EB}">
   <ds:schemaRefs>
     <ds:schemaRef ds:uri="http://schemas.microsoft.com/office/2006/metadata/contentType"/>
@@ -6061,14 +6835,6 @@
     <ds:schemaRef ds:uri="http://purl.org/dc/elements/1.1/"/>
     <ds:schemaRef ds:uri="http://purl.org/dc/terms/"/>
     <ds:schemaRef ds:uri="http://schemas.microsoft.com/internal/obd"/>
-  </ds:schemaRefs>
-</ds:datastoreItem>
-</file>
-
-<file path=customXml/itemProps2.xml><?xml version="1.0" encoding="utf-8"?>
-<ds:datastoreItem xmlns:ds="http://schemas.openxmlformats.org/officeDocument/2006/customXml" ds:itemID="{61FBE2F1-E3E5-4809-A97E-1E6B42890106}">
-  <ds:schemaRefs>
-    <ds:schemaRef ds:uri="http://schemas.microsoft.com/sharepoint/v3/contenttype/forms"/>
   </ds:schemaRefs>
 </ds:datastoreItem>
 </file>

</xml_diff>

<commit_message>
Finished adding what I have so far
</commit_message>
<xml_diff>
--- a/Aquatic-Macroinvert-Poster-CB-CW-JR.pptx
+++ b/Aquatic-Macroinvert-Poster-CB-CW-JR.pptx
@@ -143,7 +143,7 @@
 <file path=ppt/revisionInfo.xml><?xml version="1.0" encoding="utf-8"?>
 <p1510:revInfo xmlns:a="http://schemas.openxmlformats.org/drawingml/2006/main" xmlns:r="http://schemas.openxmlformats.org/officeDocument/2006/relationships" xmlns:p1510="http://schemas.microsoft.com/office/powerpoint/2015/10/main">
   <p1510:revLst>
-    <p1510:client id="{C48A9D43-CBDC-48C1-889C-5E21AE79472F}" v="72" dt="2023-04-24T21:33:05.667"/>
+    <p1510:client id="{C48A9D43-CBDC-48C1-889C-5E21AE79472F}" v="75" dt="2023-04-24T21:51:05.894"/>
   </p1510:revLst>
 </p1510:revInfo>
 </file>
@@ -153,22 +153,38 @@
   <pc:docChgLst>
     <pc:chgData name="Jonathan Ray" userId="b9a55652e1e422c6" providerId="LiveId" clId="{C48A9D43-CBDC-48C1-889C-5E21AE79472F}"/>
     <pc:docChg chg="undo redo custSel modSld">
-      <pc:chgData name="Jonathan Ray" userId="b9a55652e1e422c6" providerId="LiveId" clId="{C48A9D43-CBDC-48C1-889C-5E21AE79472F}" dt="2023-04-24T21:33:50.417" v="260" actId="5793"/>
+      <pc:chgData name="Jonathan Ray" userId="b9a55652e1e422c6" providerId="LiveId" clId="{C48A9D43-CBDC-48C1-889C-5E21AE79472F}" dt="2023-04-24T22:01:22.079" v="1119" actId="20577"/>
       <pc:docMkLst>
         <pc:docMk/>
       </pc:docMkLst>
       <pc:sldChg chg="addSp delSp modSp mod">
-        <pc:chgData name="Jonathan Ray" userId="b9a55652e1e422c6" providerId="LiveId" clId="{C48A9D43-CBDC-48C1-889C-5E21AE79472F}" dt="2023-04-24T21:33:50.417" v="260" actId="5793"/>
+        <pc:chgData name="Jonathan Ray" userId="b9a55652e1e422c6" providerId="LiveId" clId="{C48A9D43-CBDC-48C1-889C-5E21AE79472F}" dt="2023-04-24T22:01:22.079" v="1119" actId="20577"/>
         <pc:sldMkLst>
           <pc:docMk/>
           <pc:sldMk cId="1439006157" sldId="258"/>
         </pc:sldMkLst>
+        <pc:spChg chg="add mod">
+          <ac:chgData name="Jonathan Ray" userId="b9a55652e1e422c6" providerId="LiveId" clId="{C48A9D43-CBDC-48C1-889C-5E21AE79472F}" dt="2023-04-24T21:52:08.969" v="894" actId="20577"/>
+          <ac:spMkLst>
+            <pc:docMk/>
+            <pc:sldMk cId="1439006157" sldId="258"/>
+            <ac:spMk id="7" creationId="{DB64DC89-99C9-7FDC-E40F-219010A6FB59}"/>
+          </ac:spMkLst>
+        </pc:spChg>
         <pc:spChg chg="mod">
-          <ac:chgData name="Jonathan Ray" userId="b9a55652e1e422c6" providerId="LiveId" clId="{C48A9D43-CBDC-48C1-889C-5E21AE79472F}" dt="2023-04-24T21:33:50.417" v="260" actId="5793"/>
+          <ac:chgData name="Jonathan Ray" userId="b9a55652e1e422c6" providerId="LiveId" clId="{C48A9D43-CBDC-48C1-889C-5E21AE79472F}" dt="2023-04-24T21:43:00.725" v="321" actId="20577"/>
           <ac:spMkLst>
             <pc:docMk/>
             <pc:sldMk cId="1439006157" sldId="258"/>
             <ac:spMk id="8" creationId="{6B539B43-F688-8CDC-1ADF-5582C68FB58E}"/>
+          </ac:spMkLst>
+        </pc:spChg>
+        <pc:spChg chg="mod">
+          <ac:chgData name="Jonathan Ray" userId="b9a55652e1e422c6" providerId="LiveId" clId="{C48A9D43-CBDC-48C1-889C-5E21AE79472F}" dt="2023-04-24T21:45:34.357" v="459" actId="20577"/>
+          <ac:spMkLst>
+            <pc:docMk/>
+            <pc:sldMk cId="1439006157" sldId="258"/>
+            <ac:spMk id="9" creationId="{AD81A253-04C3-61DF-0491-A8552E8F2B81}"/>
           </ac:spMkLst>
         </pc:spChg>
         <pc:spChg chg="del mod">
@@ -180,7 +196,31 @@
           </ac:spMkLst>
         </pc:spChg>
         <pc:spChg chg="mod">
-          <ac:chgData name="Jonathan Ray" userId="b9a55652e1e422c6" providerId="LiveId" clId="{C48A9D43-CBDC-48C1-889C-5E21AE79472F}" dt="2023-04-24T21:31:09.630" v="220" actId="20577"/>
+          <ac:chgData name="Jonathan Ray" userId="b9a55652e1e422c6" providerId="LiveId" clId="{C48A9D43-CBDC-48C1-889C-5E21AE79472F}" dt="2023-04-24T21:54:48.128" v="971" actId="20577"/>
+          <ac:spMkLst>
+            <pc:docMk/>
+            <pc:sldMk cId="1439006157" sldId="258"/>
+            <ac:spMk id="16" creationId="{00000000-0000-0000-0000-000000000000}"/>
+          </ac:spMkLst>
+        </pc:spChg>
+        <pc:spChg chg="mod">
+          <ac:chgData name="Jonathan Ray" userId="b9a55652e1e422c6" providerId="LiveId" clId="{C48A9D43-CBDC-48C1-889C-5E21AE79472F}" dt="2023-04-24T21:59:55.863" v="1082" actId="113"/>
+          <ac:spMkLst>
+            <pc:docMk/>
+            <pc:sldMk cId="1439006157" sldId="258"/>
+            <ac:spMk id="17" creationId="{00000000-0000-0000-0000-000000000000}"/>
+          </ac:spMkLst>
+        </pc:spChg>
+        <pc:spChg chg="mod">
+          <ac:chgData name="Jonathan Ray" userId="b9a55652e1e422c6" providerId="LiveId" clId="{C48A9D43-CBDC-48C1-889C-5E21AE79472F}" dt="2023-04-24T22:01:22.079" v="1119" actId="20577"/>
+          <ac:spMkLst>
+            <pc:docMk/>
+            <pc:sldMk cId="1439006157" sldId="258"/>
+            <ac:spMk id="18" creationId="{00000000-0000-0000-0000-000000000000}"/>
+          </ac:spMkLst>
+        </pc:spChg>
+        <pc:spChg chg="mod">
+          <ac:chgData name="Jonathan Ray" userId="b9a55652e1e422c6" providerId="LiveId" clId="{C48A9D43-CBDC-48C1-889C-5E21AE79472F}" dt="2023-04-24T21:42:16.512" v="264" actId="20577"/>
           <ac:spMkLst>
             <pc:docMk/>
             <pc:sldMk cId="1439006157" sldId="258"/>
@@ -211,8 +251,16 @@
             <ac:picMk id="7" creationId="{B6F3872D-AFCF-76F9-B4EC-DED08D7B5FC8}"/>
           </ac:picMkLst>
         </pc:picChg>
+        <pc:picChg chg="add mod modCrop">
+          <ac:chgData name="Jonathan Ray" userId="b9a55652e1e422c6" providerId="LiveId" clId="{C48A9D43-CBDC-48C1-889C-5E21AE79472F}" dt="2023-04-24T21:51:31.243" v="893" actId="1076"/>
+          <ac:picMkLst>
+            <pc:docMk/>
+            <pc:sldMk cId="1439006157" sldId="258"/>
+            <ac:picMk id="11" creationId="{E9072077-F56E-3B80-1BBC-5C3C9F55F4A4}"/>
+          </ac:picMkLst>
+        </pc:picChg>
         <pc:picChg chg="add mod">
-          <ac:chgData name="Jonathan Ray" userId="b9a55652e1e422c6" providerId="LiveId" clId="{C48A9D43-CBDC-48C1-889C-5E21AE79472F}" dt="2023-04-24T21:25:23.905" v="127" actId="1076"/>
+          <ac:chgData name="Jonathan Ray" userId="b9a55652e1e422c6" providerId="LiveId" clId="{C48A9D43-CBDC-48C1-889C-5E21AE79472F}" dt="2023-04-24T21:42:12.019" v="263" actId="1076"/>
           <ac:picMkLst>
             <pc:docMk/>
             <pc:sldMk cId="1439006157" sldId="258"/>
@@ -235,8 +283,8 @@
             <ac:picMk id="24" creationId="{6F027826-D590-3FB1-E4D9-6967DA5686B1}"/>
           </ac:picMkLst>
         </pc:picChg>
-        <pc:picChg chg="add del mod ord">
-          <ac:chgData name="Jonathan Ray" userId="b9a55652e1e422c6" providerId="LiveId" clId="{C48A9D43-CBDC-48C1-889C-5E21AE79472F}" dt="2023-04-24T21:32:18.434" v="227" actId="478"/>
+        <pc:picChg chg="add del mod ord modCrop">
+          <ac:chgData name="Jonathan Ray" userId="b9a55652e1e422c6" providerId="LiveId" clId="{C48A9D43-CBDC-48C1-889C-5E21AE79472F}" dt="2023-04-24T21:41:41.996" v="261" actId="732"/>
           <ac:picMkLst>
             <pc:docMk/>
             <pc:sldMk cId="1439006157" sldId="258"/>
@@ -3513,7 +3561,7 @@
           </p:cNvPicPr>
           <p:nvPr/>
         </p:nvPicPr>
-        <p:blipFill>
+        <p:blipFill rotWithShape="1">
           <a:blip r:embed="rId2">
             <a:extLst>
               <a:ext uri="{28A0092B-C50C-407E-A947-70E740481C1C}">
@@ -3521,14 +3569,13 @@
               </a:ext>
             </a:extLst>
           </a:blip>
-          <a:stretch>
-            <a:fillRect/>
-          </a:stretch>
+          <a:srcRect b="14342"/>
+          <a:stretch/>
         </p:blipFill>
         <p:spPr>
           <a:xfrm>
             <a:off x="0" y="0"/>
-            <a:ext cx="38404799" cy="38430200"/>
+            <a:ext cx="38404799" cy="32918400"/>
           </a:xfrm>
           <a:prstGeom prst="rect">
             <a:avLst/>
@@ -3971,16 +4018,348 @@
           </a:p>
         </p:txBody>
       </p:sp>
-      <p:sp>
-        <p:nvSpPr>
-          <p:cNvPr id="16" name="Rectangle 15"/>
+      <mc:AlternateContent xmlns:mc="http://schemas.openxmlformats.org/markup-compatibility/2006">
+        <mc:Choice xmlns:a14="http://schemas.microsoft.com/office/drawing/2010/main" Requires="a14">
+          <p:sp>
+            <p:nvSpPr>
+              <p:cNvPr id="16" name="Rectangle 15"/>
+              <p:cNvSpPr/>
+              <p:nvPr/>
+            </p:nvSpPr>
+            <p:spPr>
+              <a:xfrm>
+                <a:off x="26545541" y="10751428"/>
+                <a:ext cx="11384280" cy="5112786"/>
+              </a:xfrm>
+              <a:prstGeom prst="rect">
+                <a:avLst/>
+              </a:prstGeom>
+              <a:solidFill>
+                <a:schemeClr val="bg1"/>
+              </a:solidFill>
+              <a:ln w="6350">
+                <a:solidFill>
+                  <a:schemeClr val="tx1"/>
+                </a:solidFill>
+              </a:ln>
+            </p:spPr>
+            <p:style>
+              <a:lnRef idx="2">
+                <a:schemeClr val="accent1">
+                  <a:shade val="50000"/>
+                </a:schemeClr>
+              </a:lnRef>
+              <a:fillRef idx="1">
+                <a:schemeClr val="accent1"/>
+              </a:fillRef>
+              <a:effectRef idx="0">
+                <a:schemeClr val="accent1"/>
+              </a:effectRef>
+              <a:fontRef idx="minor">
+                <a:schemeClr val="lt1"/>
+              </a:fontRef>
+            </p:style>
+            <p:txBody>
+              <a:bodyPr rtlCol="0" anchor="t"/>
+              <a:lstStyle/>
+              <a:p>
+                <a:pPr defTabSz="3511068"/>
+                <a:r>
+                  <a:rPr lang="en-US" sz="4400" b="1" dirty="0">
+                    <a:solidFill>
+                      <a:prstClr val="black"/>
+                    </a:solidFill>
+                    <a:latin typeface="Avenir Book" charset="0"/>
+                    <a:ea typeface="Avenir Book" charset="0"/>
+                    <a:cs typeface="Avenir Book" charset="0"/>
+                  </a:rPr>
+                  <a:t>Results</a:t>
+                </a:r>
+              </a:p>
+              <a:p>
+                <a:pPr defTabSz="3511068"/>
+                <a:endParaRPr lang="en-US" sz="4400" b="1" dirty="0">
+                  <a:solidFill>
+                    <a:prstClr val="black"/>
+                  </a:solidFill>
+                  <a:latin typeface="Avenir Book" charset="0"/>
+                  <a:ea typeface="Avenir Book" charset="0"/>
+                  <a:cs typeface="Avenir Book" charset="0"/>
+                </a:endParaRPr>
+              </a:p>
+              <a:p>
+                <a:pPr marL="571500" indent="-571500" defTabSz="3511068">
+                  <a:buFont typeface="Arial" panose="020B0604020202020204" pitchFamily="34" charset="0"/>
+                  <a:buChar char="•"/>
+                </a:pPr>
+                <a:r>
+                  <a:rPr lang="en-US" sz="3200" dirty="0">
+                    <a:solidFill>
+                      <a:prstClr val="black"/>
+                    </a:solidFill>
+                    <a:latin typeface="Avenir Book" charset="0"/>
+                    <a:ea typeface="Avenir Book" charset="0"/>
+                    <a:cs typeface="Avenir Book" charset="0"/>
+                  </a:rPr>
+                  <a:t>No correlation was found between riparian cover and species richness of aquatic macroinvertebrates </a:t>
+                </a:r>
+                <a:r>
+                  <a:rPr lang="en-US" sz="2000" dirty="0">
+                    <a:solidFill>
+                      <a:prstClr val="black"/>
+                    </a:solidFill>
+                    <a:latin typeface="Avenir Book" charset="0"/>
+                    <a:ea typeface="Avenir Book" charset="0"/>
+                    <a:cs typeface="Avenir Book" charset="0"/>
+                  </a:rPr>
+                  <a:t>(</a:t>
+                </a:r>
+                <a14:m>
+                  <m:oMath xmlns:m="http://schemas.openxmlformats.org/officeDocument/2006/math">
+                    <m:sSup>
+                      <m:sSupPr>
+                        <m:ctrlPr>
+                          <a:rPr lang="en-US" sz="2000" b="0" i="1" smtClean="0">
+                            <a:solidFill>
+                              <a:prstClr val="black"/>
+                            </a:solidFill>
+                            <a:latin typeface="Cambria Math" panose="02040503050406030204" pitchFamily="18" charset="0"/>
+                            <a:ea typeface="Avenir Book" charset="0"/>
+                            <a:cs typeface="Avenir Book" charset="0"/>
+                          </a:rPr>
+                        </m:ctrlPr>
+                      </m:sSupPr>
+                      <m:e>
+                        <m:r>
+                          <a:rPr lang="en-US" sz="2000" b="0" i="1" smtClean="0">
+                            <a:solidFill>
+                              <a:prstClr val="black"/>
+                            </a:solidFill>
+                            <a:latin typeface="Cambria Math" panose="02040503050406030204" pitchFamily="18" charset="0"/>
+                            <a:ea typeface="Avenir Book" charset="0"/>
+                            <a:cs typeface="Avenir Book" charset="0"/>
+                          </a:rPr>
+                          <m:t>𝑅</m:t>
+                        </m:r>
+                      </m:e>
+                      <m:sup>
+                        <m:r>
+                          <a:rPr lang="en-US" sz="2000" b="0" i="1" smtClean="0">
+                            <a:solidFill>
+                              <a:prstClr val="black"/>
+                            </a:solidFill>
+                            <a:latin typeface="Cambria Math" panose="02040503050406030204" pitchFamily="18" charset="0"/>
+                            <a:ea typeface="Avenir Book" charset="0"/>
+                            <a:cs typeface="Avenir Book" charset="0"/>
+                          </a:rPr>
+                          <m:t>2</m:t>
+                        </m:r>
+                      </m:sup>
+                    </m:sSup>
+                    <m:r>
+                      <a:rPr lang="en-US" sz="2000" b="0" i="1" smtClean="0">
+                        <a:solidFill>
+                          <a:prstClr val="black"/>
+                        </a:solidFill>
+                        <a:latin typeface="Cambria Math" panose="02040503050406030204" pitchFamily="18" charset="0"/>
+                        <a:ea typeface="Avenir Book" charset="0"/>
+                        <a:cs typeface="Avenir Book" charset="0"/>
+                      </a:rPr>
+                      <m:t>=0.15, </m:t>
+                    </m:r>
+                    <m:r>
+                      <a:rPr lang="en-US" sz="2000" b="0" i="1" smtClean="0">
+                        <a:solidFill>
+                          <a:prstClr val="black"/>
+                        </a:solidFill>
+                        <a:latin typeface="Cambria Math" panose="02040503050406030204" pitchFamily="18" charset="0"/>
+                        <a:ea typeface="Avenir Book" charset="0"/>
+                        <a:cs typeface="Avenir Book" charset="0"/>
+                      </a:rPr>
+                      <m:t>𝑡</m:t>
+                    </m:r>
+                    <m:r>
+                      <a:rPr lang="en-US" sz="2000" b="0" i="1" smtClean="0">
+                        <a:solidFill>
+                          <a:prstClr val="black"/>
+                        </a:solidFill>
+                        <a:latin typeface="Cambria Math" panose="02040503050406030204" pitchFamily="18" charset="0"/>
+                        <a:ea typeface="Avenir Book" charset="0"/>
+                        <a:cs typeface="Avenir Book" charset="0"/>
+                      </a:rPr>
+                      <m:t>=1.13, </m:t>
+                    </m:r>
+                    <m:r>
+                      <a:rPr lang="en-US" sz="2000" b="0" i="1" smtClean="0">
+                        <a:solidFill>
+                          <a:prstClr val="black"/>
+                        </a:solidFill>
+                        <a:latin typeface="Cambria Math" panose="02040503050406030204" pitchFamily="18" charset="0"/>
+                        <a:ea typeface="Avenir Book" charset="0"/>
+                        <a:cs typeface="Avenir Book" charset="0"/>
+                      </a:rPr>
+                      <m:t>𝑝</m:t>
+                    </m:r>
+                    <m:r>
+                      <a:rPr lang="en-US" sz="2000" b="0" i="1" smtClean="0">
+                        <a:solidFill>
+                          <a:prstClr val="black"/>
+                        </a:solidFill>
+                        <a:latin typeface="Cambria Math" panose="02040503050406030204" pitchFamily="18" charset="0"/>
+                        <a:ea typeface="Avenir Book" charset="0"/>
+                        <a:cs typeface="Avenir Book" charset="0"/>
+                      </a:rPr>
+                      <m:t>=0.3</m:t>
+                    </m:r>
+                  </m:oMath>
+                </a14:m>
+                <a:r>
+                  <a:rPr lang="en-US" sz="2000" dirty="0">
+                    <a:solidFill>
+                      <a:prstClr val="black"/>
+                    </a:solidFill>
+                    <a:latin typeface="Avenir Book" charset="0"/>
+                    <a:ea typeface="Avenir Book" charset="0"/>
+                    <a:cs typeface="Avenir Book" charset="0"/>
+                  </a:rPr>
+                  <a:t>) </a:t>
+                </a:r>
+              </a:p>
+              <a:p>
+                <a:pPr marL="571500" indent="-571500" defTabSz="3511068">
+                  <a:buFont typeface="Arial" panose="020B0604020202020204" pitchFamily="34" charset="0"/>
+                  <a:buChar char="•"/>
+                </a:pPr>
+                <a:r>
+                  <a:rPr lang="en-US" sz="3200" dirty="0">
+                    <a:solidFill>
+                      <a:prstClr val="black"/>
+                    </a:solidFill>
+                    <a:latin typeface="Avenir Book" charset="0"/>
+                    <a:ea typeface="Avenir Book" charset="0"/>
+                    <a:cs typeface="Avenir Book" charset="0"/>
+                  </a:rPr>
+                  <a:t>Average canopy cover was fairly consistent across all years at each site </a:t>
+                </a:r>
+                <a:r>
+                  <a:rPr lang="en-US" sz="2000" dirty="0">
+                    <a:solidFill>
+                      <a:prstClr val="black"/>
+                    </a:solidFill>
+                    <a:latin typeface="Avenir Book" charset="0"/>
+                    <a:ea typeface="Avenir Book" charset="0"/>
+                    <a:cs typeface="Avenir Book" charset="0"/>
+                  </a:rPr>
+                  <a:t>(Figure 2)</a:t>
+                </a:r>
+              </a:p>
+              <a:p>
+                <a:pPr marL="571500" indent="-571500" defTabSz="3511068">
+                  <a:buFont typeface="Arial" panose="020B0604020202020204" pitchFamily="34" charset="0"/>
+                  <a:buChar char="•"/>
+                </a:pPr>
+                <a:r>
+                  <a:rPr lang="en-US" sz="3200" dirty="0">
+                    <a:solidFill>
+                      <a:prstClr val="black"/>
+                    </a:solidFill>
+                    <a:latin typeface="Avenir Book" charset="0"/>
+                    <a:ea typeface="Avenir Book" charset="0"/>
+                    <a:cs typeface="Avenir Book" charset="0"/>
+                  </a:rPr>
+                  <a:t>Species richness varied widely in Mayfield Creek and Upper Big Creek, but were fairly consistent in </a:t>
+                </a:r>
+                <a:r>
+                  <a:rPr lang="en-US" sz="3200" dirty="0" err="1">
+                    <a:solidFill>
+                      <a:prstClr val="black"/>
+                    </a:solidFill>
+                    <a:latin typeface="Avenir Book" charset="0"/>
+                    <a:ea typeface="Avenir Book" charset="0"/>
+                    <a:cs typeface="Avenir Book" charset="0"/>
+                  </a:rPr>
+                  <a:t>Oksrukuyik</a:t>
+                </a:r>
+                <a:r>
+                  <a:rPr lang="en-US" sz="3200" dirty="0">
+                    <a:solidFill>
+                      <a:prstClr val="black"/>
+                    </a:solidFill>
+                    <a:latin typeface="Avenir Book" charset="0"/>
+                    <a:ea typeface="Avenir Book" charset="0"/>
+                    <a:cs typeface="Avenir Book" charset="0"/>
+                  </a:rPr>
+                  <a:t> Creek </a:t>
+                </a:r>
+                <a:r>
+                  <a:rPr lang="en-US" sz="2000" dirty="0">
+                    <a:solidFill>
+                      <a:prstClr val="black"/>
+                    </a:solidFill>
+                    <a:latin typeface="Avenir Book" charset="0"/>
+                    <a:ea typeface="Avenir Book" charset="0"/>
+                    <a:cs typeface="Avenir Book" charset="0"/>
+                  </a:rPr>
+                  <a:t>(Figure 3)</a:t>
+                </a:r>
+              </a:p>
+            </p:txBody>
+          </p:sp>
+        </mc:Choice>
+        <mc:Fallback>
+          <p:sp>
+            <p:nvSpPr>
+              <p:cNvPr id="16" name="Rectangle 15"/>
+              <p:cNvSpPr>
+                <a:spLocks noRot="1" noChangeAspect="1" noMove="1" noResize="1" noEditPoints="1" noAdjustHandles="1" noChangeArrowheads="1" noChangeShapeType="1" noTextEdit="1"/>
+              </p:cNvSpPr>
+              <p:nvPr/>
+            </p:nvSpPr>
+            <p:spPr>
+              <a:xfrm>
+                <a:off x="26545541" y="10751428"/>
+                <a:ext cx="11384280" cy="5112786"/>
+              </a:xfrm>
+              <a:prstGeom prst="rect">
+                <a:avLst/>
+              </a:prstGeom>
+              <a:blipFill>
+                <a:blip r:embed="rId3"/>
+                <a:stretch>
+                  <a:fillRect l="-2195" t="-2622" r="-803"/>
+                </a:stretch>
+              </a:blipFill>
+              <a:ln w="6350">
+                <a:solidFill>
+                  <a:schemeClr val="tx1"/>
+                </a:solidFill>
+              </a:ln>
+            </p:spPr>
+            <p:txBody>
+              <a:bodyPr/>
+              <a:lstStyle/>
+              <a:p>
+                <a:r>
+                  <a:rPr lang="en-US">
+                    <a:noFill/>
+                  </a:rPr>
+                  <a:t> </a:t>
+                </a:r>
+              </a:p>
+            </p:txBody>
+          </p:sp>
+        </mc:Fallback>
+      </mc:AlternateContent>
+      <p:sp>
+        <p:nvSpPr>
+          <p:cNvPr id="17" name="Rectangle 16"/>
           <p:cNvSpPr/>
           <p:nvPr/>
         </p:nvSpPr>
         <p:spPr>
           <a:xfrm>
-            <a:off x="26545541" y="10751428"/>
-            <a:ext cx="11384280" cy="5112786"/>
+            <a:off x="26619202" y="16728387"/>
+            <a:ext cx="11236958" cy="6688319"/>
           </a:xfrm>
           <a:prstGeom prst="rect">
             <a:avLst/>
@@ -4024,21 +4403,97 @@
                 <a:ea typeface="Avenir Book" charset="0"/>
                 <a:cs typeface="Avenir Book" charset="0"/>
               </a:rPr>
-              <a:t>Results</a:t>
-            </a:r>
-          </a:p>
-        </p:txBody>
-      </p:sp>
-      <p:sp>
-        <p:nvSpPr>
-          <p:cNvPr id="17" name="Rectangle 16"/>
+              <a:t>Discussion</a:t>
+            </a:r>
+          </a:p>
+          <a:p>
+            <a:pPr defTabSz="3511068"/>
+            <a:endParaRPr lang="en-US" sz="4400" b="1" dirty="0">
+              <a:solidFill>
+                <a:prstClr val="black"/>
+              </a:solidFill>
+              <a:latin typeface="Avenir Book" charset="0"/>
+              <a:ea typeface="Avenir Book" charset="0"/>
+              <a:cs typeface="Avenir Book" charset="0"/>
+            </a:endParaRPr>
+          </a:p>
+          <a:p>
+            <a:pPr marL="571500" indent="-571500" defTabSz="3511068">
+              <a:buFont typeface="Arial" panose="020B0604020202020204" pitchFamily="34" charset="0"/>
+              <a:buChar char="•"/>
+            </a:pPr>
+            <a:r>
+              <a:rPr lang="en-US" sz="3200" dirty="0">
+                <a:solidFill>
+                  <a:prstClr val="black"/>
+                </a:solidFill>
+                <a:latin typeface="Avenir Book" charset="0"/>
+                <a:ea typeface="Avenir Book" charset="0"/>
+                <a:cs typeface="Avenir Book" charset="0"/>
+              </a:rPr>
+              <a:t>There may be a potential relationship between riparian cover and aquatic macroinvertebrate communities that our test could not capture with only nine data points</a:t>
+            </a:r>
+          </a:p>
+          <a:p>
+            <a:pPr marL="571500" indent="-571500" defTabSz="3511068">
+              <a:buFont typeface="Arial" panose="020B0604020202020204" pitchFamily="34" charset="0"/>
+              <a:buChar char="•"/>
+            </a:pPr>
+            <a:r>
+              <a:rPr lang="en-US" sz="3200" dirty="0">
+                <a:solidFill>
+                  <a:prstClr val="black"/>
+                </a:solidFill>
+                <a:latin typeface="Avenir Book" charset="0"/>
+                <a:ea typeface="Avenir Book" charset="0"/>
+                <a:cs typeface="Avenir Book" charset="0"/>
+              </a:rPr>
+              <a:t>Sites varied in altitude and latitude which drastically impacted average temperature. Temperature is a limiting factor for insect diversity.</a:t>
+            </a:r>
+          </a:p>
+          <a:p>
+            <a:pPr marL="571500" indent="-571500" defTabSz="3511068">
+              <a:buFont typeface="Arial" panose="020B0604020202020204" pitchFamily="34" charset="0"/>
+              <a:buChar char="•"/>
+            </a:pPr>
+            <a:r>
+              <a:rPr lang="en-US" sz="3200" dirty="0">
+                <a:solidFill>
+                  <a:prstClr val="black"/>
+                </a:solidFill>
+                <a:latin typeface="Avenir Book" charset="0"/>
+                <a:ea typeface="Avenir Book" charset="0"/>
+                <a:cs typeface="Avenir Book" charset="0"/>
+              </a:rPr>
+              <a:t>Our study only examined relationships between riparian cover and macroinvertebrates in unimpaired streams to establish a baseline relationship</a:t>
+            </a:r>
+          </a:p>
+          <a:p>
+            <a:pPr marL="571500" indent="-571500" defTabSz="3511068">
+              <a:buFont typeface="Arial" panose="020B0604020202020204" pitchFamily="34" charset="0"/>
+              <a:buChar char="•"/>
+            </a:pPr>
+            <a:endParaRPr lang="en-US" sz="4400" dirty="0">
+              <a:solidFill>
+                <a:prstClr val="black"/>
+              </a:solidFill>
+              <a:latin typeface="Avenir Book" charset="0"/>
+              <a:ea typeface="Avenir Book" charset="0"/>
+              <a:cs typeface="Avenir Book" charset="0"/>
+            </a:endParaRPr>
+          </a:p>
+        </p:txBody>
+      </p:sp>
+      <p:sp>
+        <p:nvSpPr>
+          <p:cNvPr id="18" name="Rectangle 17"/>
           <p:cNvSpPr/>
           <p:nvPr/>
         </p:nvSpPr>
         <p:spPr>
           <a:xfrm>
-            <a:off x="26619202" y="16728387"/>
-            <a:ext cx="11236958" cy="7621250"/>
+            <a:off x="26692863" y="24270375"/>
+            <a:ext cx="11236958" cy="4697427"/>
           </a:xfrm>
           <a:prstGeom prst="rect">
             <a:avLst/>
@@ -4082,57 +4537,13 @@
                 <a:ea typeface="Avenir Book" charset="0"/>
                 <a:cs typeface="Avenir Book" charset="0"/>
               </a:rPr>
-              <a:t>Discussion</a:t>
-            </a:r>
-          </a:p>
-        </p:txBody>
-      </p:sp>
-      <p:sp>
-        <p:nvSpPr>
-          <p:cNvPr id="18" name="Rectangle 17"/>
-          <p:cNvSpPr/>
-          <p:nvPr/>
-        </p:nvSpPr>
-        <p:spPr>
-          <a:xfrm>
-            <a:off x="26619202" y="25286815"/>
-            <a:ext cx="11236958" cy="3547872"/>
-          </a:xfrm>
-          <a:prstGeom prst="rect">
-            <a:avLst/>
-          </a:prstGeom>
-          <a:solidFill>
-            <a:schemeClr val="bg1"/>
-          </a:solidFill>
-          <a:ln w="6350">
-            <a:solidFill>
-              <a:schemeClr val="tx1"/>
-            </a:solidFill>
-          </a:ln>
-        </p:spPr>
-        <p:style>
-          <a:lnRef idx="2">
-            <a:schemeClr val="accent1">
-              <a:shade val="50000"/>
-            </a:schemeClr>
-          </a:lnRef>
-          <a:fillRef idx="1">
-            <a:schemeClr val="accent1"/>
-          </a:fillRef>
-          <a:effectRef idx="0">
-            <a:schemeClr val="accent1"/>
-          </a:effectRef>
-          <a:fontRef idx="minor">
-            <a:schemeClr val="lt1"/>
-          </a:fontRef>
-        </p:style>
-        <p:txBody>
-          <a:bodyPr rtlCol="0" anchor="t"/>
-          <a:lstStyle/>
+              <a:t>Next Steps/Future Directions</a:t>
+            </a:r>
+          </a:p>
           <a:p>
             <a:pPr defTabSz="3511068"/>
             <a:r>
-              <a:rPr lang="en-US" sz="4400" b="1" dirty="0">
+              <a:rPr lang="en-US" sz="3200" dirty="0">
                 <a:solidFill>
                   <a:prstClr val="black"/>
                 </a:solidFill>
@@ -4140,8 +4551,106 @@
                 <a:ea typeface="Avenir Book" charset="0"/>
                 <a:cs typeface="Avenir Book" charset="0"/>
               </a:rPr>
-              <a:t>Next Steps/Future Directions</a:t>
-            </a:r>
+              <a:t>More Data</a:t>
+            </a:r>
+          </a:p>
+          <a:p>
+            <a:pPr marL="571500" indent="-571500" defTabSz="3511068">
+              <a:buFont typeface="Arial" panose="020B0604020202020204" pitchFamily="34" charset="0"/>
+              <a:buChar char="•"/>
+            </a:pPr>
+            <a:r>
+              <a:rPr lang="en-US" sz="2000" dirty="0">
+                <a:solidFill>
+                  <a:prstClr val="black"/>
+                </a:solidFill>
+                <a:latin typeface="Avenir Book" charset="0"/>
+                <a:ea typeface="Avenir Book" charset="0"/>
+                <a:cs typeface="Avenir Book" charset="0"/>
+              </a:rPr>
+              <a:t>In the future, more NEON data will be available to strengthen the test results</a:t>
+            </a:r>
+          </a:p>
+          <a:p>
+            <a:pPr defTabSz="3511068"/>
+            <a:r>
+              <a:rPr lang="en-US" sz="3200" dirty="0">
+                <a:solidFill>
+                  <a:prstClr val="black"/>
+                </a:solidFill>
+                <a:latin typeface="Avenir Book" charset="0"/>
+                <a:ea typeface="Avenir Book" charset="0"/>
+                <a:cs typeface="Avenir Book" charset="0"/>
+              </a:rPr>
+              <a:t>Geography</a:t>
+            </a:r>
+          </a:p>
+          <a:p>
+            <a:pPr marL="571500" indent="-571500" defTabSz="3511068">
+              <a:buFont typeface="Arial" panose="020B0604020202020204" pitchFamily="34" charset="0"/>
+              <a:buChar char="•"/>
+            </a:pPr>
+            <a:r>
+              <a:rPr lang="en-US" sz="2000" dirty="0">
+                <a:solidFill>
+                  <a:prstClr val="black"/>
+                </a:solidFill>
+                <a:latin typeface="Avenir Book" charset="0"/>
+                <a:ea typeface="Avenir Book" charset="0"/>
+                <a:cs typeface="Avenir Book" charset="0"/>
+              </a:rPr>
+              <a:t>Future studies, researchers should use sites in close proximity to decrease confounding variables</a:t>
+            </a:r>
+          </a:p>
+          <a:p>
+            <a:pPr defTabSz="3511068"/>
+            <a:r>
+              <a:rPr lang="en-US" sz="3200">
+                <a:solidFill>
+                  <a:prstClr val="black"/>
+                </a:solidFill>
+                <a:latin typeface="Avenir Book" charset="0"/>
+                <a:ea typeface="Avenir Book" charset="0"/>
+                <a:cs typeface="Avenir Book" charset="0"/>
+              </a:rPr>
+              <a:t>Varying Stream Type</a:t>
+            </a:r>
+            <a:endParaRPr lang="en-US" sz="3200" dirty="0">
+              <a:solidFill>
+                <a:prstClr val="black"/>
+              </a:solidFill>
+              <a:latin typeface="Avenir Book" charset="0"/>
+              <a:ea typeface="Avenir Book" charset="0"/>
+              <a:cs typeface="Avenir Book" charset="0"/>
+            </a:endParaRPr>
+          </a:p>
+          <a:p>
+            <a:pPr marL="571500" indent="-571500" defTabSz="3511068">
+              <a:buFont typeface="Arial" panose="020B0604020202020204" pitchFamily="34" charset="0"/>
+              <a:buChar char="•"/>
+            </a:pPr>
+            <a:r>
+              <a:rPr lang="en-US" sz="2000" dirty="0">
+                <a:solidFill>
+                  <a:prstClr val="black"/>
+                </a:solidFill>
+                <a:latin typeface="Avenir Book" charset="0"/>
+                <a:ea typeface="Avenir Book" charset="0"/>
+                <a:cs typeface="Avenir Book" charset="0"/>
+              </a:rPr>
+              <a:t>Future studies should compare unimpaired and impaired stream vegetation and community composition to inform policy makers</a:t>
+            </a:r>
+          </a:p>
+          <a:p>
+            <a:pPr defTabSz="3511068"/>
+            <a:endParaRPr lang="en-US" sz="4400" b="1" dirty="0">
+              <a:solidFill>
+                <a:prstClr val="black"/>
+              </a:solidFill>
+              <a:latin typeface="Avenir Book" charset="0"/>
+              <a:ea typeface="Avenir Book" charset="0"/>
+              <a:cs typeface="Avenir Book" charset="0"/>
+            </a:endParaRPr>
           </a:p>
         </p:txBody>
       </p:sp>
@@ -4155,7 +4664,7 @@
             </p:nvSpPr>
             <p:spPr>
               <a:xfrm>
-                <a:off x="12735609" y="10648866"/>
+                <a:off x="12701178" y="11000483"/>
                 <a:ext cx="13261293" cy="10135626"/>
               </a:xfrm>
               <a:prstGeom prst="rect">
@@ -4322,6 +4831,17 @@
               </a:p>
               <a:p>
                 <a:pPr algn="ctr" defTabSz="3511068"/>
+                <a:endParaRPr lang="en-US" sz="2000" i="1" dirty="0">
+                  <a:solidFill>
+                    <a:prstClr val="black"/>
+                  </a:solidFill>
+                  <a:latin typeface="Avenir Book" charset="0"/>
+                  <a:ea typeface="Avenir Book" charset="0"/>
+                  <a:cs typeface="Avenir Book" charset="0"/>
+                </a:endParaRPr>
+              </a:p>
+              <a:p>
+                <a:pPr algn="ctr" defTabSz="3511068"/>
                 <a:r>
                   <a:rPr lang="en-US" sz="2000" i="1" dirty="0">
                     <a:solidFill>
@@ -4466,16 +4986,16 @@
             </p:nvSpPr>
             <p:spPr>
               <a:xfrm>
-                <a:off x="12735609" y="10648866"/>
+                <a:off x="12701178" y="11000483"/>
                 <a:ext cx="13261293" cy="10135626"/>
               </a:xfrm>
               <a:prstGeom prst="rect">
                 <a:avLst/>
               </a:prstGeom>
               <a:blipFill>
-                <a:blip r:embed="rId3"/>
+                <a:blip r:embed="rId4"/>
                 <a:stretch>
-                  <a:fillRect l="-1838" t="-1323"/>
+                  <a:fillRect l="-1885" t="-1324"/>
                 </a:stretch>
               </a:blipFill>
               <a:ln w="6350">
@@ -4506,7 +5026,7 @@
           <p:nvPr/>
         </p:nvPicPr>
         <p:blipFill>
-          <a:blip r:embed="rId4" cstate="print">
+          <a:blip r:embed="rId5" cstate="print">
             <a:extLst>
               <a:ext uri="{28A0092B-C50C-407E-A947-70E740481C1C}">
                 <a14:useLocalDpi xmlns:a14="http://schemas.microsoft.com/office/drawing/2010/main" val="0"/>
@@ -4839,7 +5359,7 @@
           <a:p>
             <a:pPr defTabSz="3511068"/>
             <a:r>
-              <a:rPr lang="en-US" sz="4400" b="1" dirty="0">
+              <a:rPr lang="en-US" sz="4400" b="1" dirty="0" err="1">
                 <a:solidFill>
                   <a:prstClr val="black"/>
                 </a:solidFill>
@@ -4847,13 +5367,10 @@
                 <a:ea typeface="Avenir Book" charset="0"/>
                 <a:cs typeface="Avenir Book" charset="0"/>
               </a:rPr>
-              <a:t>Site 2: Mayfield Creek, Alabama</a:t>
-            </a:r>
-          </a:p>
-          <a:p>
-            <a:pPr defTabSz="3511068"/>
-            <a:r>
-              <a:rPr lang="en-US" sz="4400" b="1">
+              <a:t>Oksrukuyik</a:t>
+            </a:r>
+            <a:r>
+              <a:rPr lang="en-US" sz="4400" b="1" dirty="0">
                 <a:solidFill>
                   <a:prstClr val="black"/>
                 </a:solidFill>
@@ -4861,16 +5378,22 @@
                 <a:ea typeface="Avenir Book" charset="0"/>
                 <a:cs typeface="Avenir Book" charset="0"/>
               </a:rPr>
-              <a:t>Hi </a:t>
-            </a:r>
-            <a:endParaRPr lang="en-US" sz="4400" b="1" dirty="0">
-              <a:solidFill>
-                <a:prstClr val="black"/>
-              </a:solidFill>
-              <a:latin typeface="Avenir Book" charset="0"/>
-              <a:ea typeface="Avenir Book" charset="0"/>
-              <a:cs typeface="Avenir Book" charset="0"/>
-            </a:endParaRPr>
+              <a:t> Creek, Alaska</a:t>
+            </a:r>
+          </a:p>
+          <a:p>
+            <a:pPr defTabSz="3511068"/>
+            <a:r>
+              <a:rPr lang="en-US" sz="4400" b="1" dirty="0">
+                <a:solidFill>
+                  <a:prstClr val="black"/>
+                </a:solidFill>
+                <a:latin typeface="Avenir Book" charset="0"/>
+                <a:ea typeface="Avenir Book" charset="0"/>
+                <a:cs typeface="Avenir Book" charset="0"/>
+              </a:rPr>
+              <a:t> </a:t>
+            </a:r>
           </a:p>
         </p:txBody>
       </p:sp>
@@ -4933,8 +5456,19 @@
                 <a:ea typeface="Avenir Book" charset="0"/>
                 <a:cs typeface="Avenir Book" charset="0"/>
               </a:rPr>
-              <a:t>Site 3: Oksrukuyik Creek</a:t>
-            </a:r>
+              <a:t>Mayfield Creek, Alabama</a:t>
+            </a:r>
+          </a:p>
+          <a:p>
+            <a:pPr defTabSz="3511068"/>
+            <a:endParaRPr lang="en-US" sz="3200" dirty="0">
+              <a:solidFill>
+                <a:prstClr val="black"/>
+              </a:solidFill>
+              <a:latin typeface="Avenir Book" charset="0"/>
+              <a:ea typeface="Avenir Book" charset="0"/>
+              <a:cs typeface="Avenir Book" charset="0"/>
+            </a:endParaRPr>
           </a:p>
         </p:txBody>
       </p:sp>
@@ -5084,7 +5618,7 @@
           <p:nvPr/>
         </p:nvPicPr>
         <p:blipFill>
-          <a:blip r:embed="rId5">
+          <a:blip r:embed="rId6">
             <a:extLst>
               <a:ext uri="{28A0092B-C50C-407E-A947-70E740481C1C}">
                 <a14:useLocalDpi xmlns:a14="http://schemas.microsoft.com/office/drawing/2010/main" val="0"/>
@@ -5131,7 +5665,7 @@
           <p:nvPr/>
         </p:nvPicPr>
         <p:blipFill>
-          <a:blip r:embed="rId6">
+          <a:blip r:embed="rId7">
             <a:extLst>
               <a:ext uri="{28A0092B-C50C-407E-A947-70E740481C1C}">
                 <a14:useLocalDpi xmlns:a14="http://schemas.microsoft.com/office/drawing/2010/main" val="0"/>
@@ -5382,7 +5916,7 @@
           <p:nvPr/>
         </p:nvPicPr>
         <p:blipFill>
-          <a:blip r:embed="rId7">
+          <a:blip r:embed="rId8">
             <a:extLst>
               <a:ext uri="{28A0092B-C50C-407E-A947-70E740481C1C}">
                 <a14:useLocalDpi xmlns:a14="http://schemas.microsoft.com/office/drawing/2010/main" val="0"/>
@@ -5395,7 +5929,7 @@
         </p:blipFill>
         <p:spPr>
           <a:xfrm>
-            <a:off x="13792153" y="11385067"/>
+            <a:off x="13792153" y="12235738"/>
             <a:ext cx="10515694" cy="6498867"/>
           </a:xfrm>
           <a:prstGeom prst="rect">
@@ -5418,7 +5952,7 @@
           <p:nvPr/>
         </p:nvPicPr>
         <p:blipFill>
-          <a:blip r:embed="rId8">
+          <a:blip r:embed="rId9">
             <a:extLst>
               <a:ext uri="{28A0092B-C50C-407E-A947-70E740481C1C}">
                 <a14:useLocalDpi xmlns:a14="http://schemas.microsoft.com/office/drawing/2010/main" val="0"/>
@@ -5454,7 +5988,7 @@
           <p:nvPr/>
         </p:nvPicPr>
         <p:blipFill>
-          <a:blip r:embed="rId9">
+          <a:blip r:embed="rId10">
             <a:extLst>
               <a:ext uri="{28A0092B-C50C-407E-A947-70E740481C1C}">
                 <a14:useLocalDpi xmlns:a14="http://schemas.microsoft.com/office/drawing/2010/main" val="0"/>
@@ -5780,6 +6314,259 @@
           </a:p>
         </p:txBody>
       </p:sp>
+      <p:sp>
+        <p:nvSpPr>
+          <p:cNvPr id="7" name="TextBox 6">
+            <a:extLst>
+              <a:ext uri="{FF2B5EF4-FFF2-40B4-BE49-F238E27FC236}">
+                <a16:creationId xmlns:a16="http://schemas.microsoft.com/office/drawing/2014/main" id="{DB64DC89-99C9-7FDC-E40F-219010A6FB59}"/>
+              </a:ext>
+            </a:extLst>
+          </p:cNvPr>
+          <p:cNvSpPr txBox="1"/>
+          <p:nvPr/>
+        </p:nvSpPr>
+        <p:spPr>
+          <a:xfrm>
+            <a:off x="26838589" y="4769714"/>
+            <a:ext cx="6270171" cy="5324535"/>
+          </a:xfrm>
+          <a:prstGeom prst="rect">
+            <a:avLst/>
+          </a:prstGeom>
+          <a:noFill/>
+        </p:spPr>
+        <p:txBody>
+          <a:bodyPr wrap="square" rtlCol="0">
+            <a:spAutoFit/>
+          </a:bodyPr>
+          <a:lstStyle/>
+          <a:p>
+            <a:pPr defTabSz="3511068"/>
+            <a:r>
+              <a:rPr lang="en-US" sz="3200" dirty="0">
+                <a:solidFill>
+                  <a:prstClr val="black"/>
+                </a:solidFill>
+                <a:latin typeface="Avenir Book" charset="0"/>
+                <a:ea typeface="Avenir Book" charset="0"/>
+                <a:cs typeface="Avenir Book" charset="0"/>
+              </a:rPr>
+              <a:t>Location:</a:t>
+            </a:r>
+          </a:p>
+          <a:p>
+            <a:pPr marL="342900" indent="-342900" defTabSz="3511068">
+              <a:buFont typeface="Arial" panose="020B0604020202020204" pitchFamily="34" charset="0"/>
+              <a:buChar char="•"/>
+            </a:pPr>
+            <a:r>
+              <a:rPr lang="en-US" sz="2000" dirty="0">
+                <a:solidFill>
+                  <a:prstClr val="black"/>
+                </a:solidFill>
+                <a:latin typeface="Avenir Book" charset="0"/>
+                <a:ea typeface="Avenir Book" charset="0"/>
+                <a:cs typeface="Avenir Book" charset="0"/>
+              </a:rPr>
+              <a:t>Talladega National Forest in west-central Alabama</a:t>
+            </a:r>
+          </a:p>
+          <a:p>
+            <a:pPr defTabSz="3511068"/>
+            <a:r>
+              <a:rPr lang="en-US" sz="3200" dirty="0">
+                <a:solidFill>
+                  <a:prstClr val="black"/>
+                </a:solidFill>
+                <a:latin typeface="Avenir Book" charset="0"/>
+                <a:ea typeface="Avenir Book" charset="0"/>
+                <a:cs typeface="Avenir Book" charset="0"/>
+              </a:rPr>
+              <a:t>Climate:</a:t>
+            </a:r>
+          </a:p>
+          <a:p>
+            <a:pPr marL="342900" indent="-342900" defTabSz="3511068">
+              <a:buFont typeface="Arial" panose="020B0604020202020204" pitchFamily="34" charset="0"/>
+              <a:buChar char="•"/>
+            </a:pPr>
+            <a:r>
+              <a:rPr lang="en-US" sz="2000" dirty="0">
+                <a:solidFill>
+                  <a:prstClr val="black"/>
+                </a:solidFill>
+                <a:latin typeface="Avenir Book" charset="0"/>
+                <a:ea typeface="Avenir Book" charset="0"/>
+                <a:cs typeface="Avenir Book" charset="0"/>
+              </a:rPr>
+              <a:t>Subtropical climate; hot, humid temperatures </a:t>
+            </a:r>
+          </a:p>
+          <a:p>
+            <a:pPr marL="342900" indent="-342900" defTabSz="3511068">
+              <a:buFont typeface="Arial" panose="020B0604020202020204" pitchFamily="34" charset="0"/>
+              <a:buChar char="•"/>
+            </a:pPr>
+            <a:r>
+              <a:rPr lang="en-US" sz="2000" dirty="0">
+                <a:solidFill>
+                  <a:prstClr val="black"/>
+                </a:solidFill>
+                <a:latin typeface="Avenir Book" charset="0"/>
+                <a:ea typeface="Avenir Book" charset="0"/>
+                <a:cs typeface="Avenir Book" charset="0"/>
+              </a:rPr>
+              <a:t>Year-round precipitation</a:t>
+            </a:r>
+          </a:p>
+          <a:p>
+            <a:pPr defTabSz="3511068"/>
+            <a:r>
+              <a:rPr lang="en-US" sz="3200" dirty="0">
+                <a:solidFill>
+                  <a:prstClr val="black"/>
+                </a:solidFill>
+                <a:latin typeface="Avenir Book" charset="0"/>
+                <a:ea typeface="Avenir Book" charset="0"/>
+                <a:cs typeface="Avenir Book" charset="0"/>
+              </a:rPr>
+              <a:t>Soil Composition:</a:t>
+            </a:r>
+          </a:p>
+          <a:p>
+            <a:pPr marL="342900" indent="-342900" defTabSz="3511068">
+              <a:buFont typeface="Arial" panose="020B0604020202020204" pitchFamily="34" charset="0"/>
+              <a:buChar char="•"/>
+            </a:pPr>
+            <a:r>
+              <a:rPr lang="en-US" sz="2000" dirty="0">
+                <a:solidFill>
+                  <a:prstClr val="black"/>
+                </a:solidFill>
+                <a:latin typeface="Avenir Book" charset="0"/>
+                <a:ea typeface="Avenir Book" charset="0"/>
+                <a:cs typeface="Avenir Book" charset="0"/>
+              </a:rPr>
+              <a:t>Sandy banks with clay and mudstone soil surrounding</a:t>
+            </a:r>
+          </a:p>
+          <a:p>
+            <a:pPr defTabSz="3511068"/>
+            <a:r>
+              <a:rPr lang="en-US" sz="3200" dirty="0">
+                <a:solidFill>
+                  <a:prstClr val="black"/>
+                </a:solidFill>
+                <a:latin typeface="Avenir Book" charset="0"/>
+                <a:ea typeface="Avenir Book" charset="0"/>
+                <a:cs typeface="Avenir Book" charset="0"/>
+              </a:rPr>
+              <a:t>Primary Vegetation:</a:t>
+            </a:r>
+          </a:p>
+          <a:p>
+            <a:pPr marL="342900" indent="-342900" defTabSz="3511068">
+              <a:buFont typeface="Arial" panose="020B0604020202020204" pitchFamily="34" charset="0"/>
+              <a:buChar char="•"/>
+            </a:pPr>
+            <a:r>
+              <a:rPr lang="en-US" sz="2000" dirty="0">
+                <a:solidFill>
+                  <a:prstClr val="black"/>
+                </a:solidFill>
+                <a:latin typeface="Avenir Book" charset="0"/>
+                <a:ea typeface="Avenir Book" charset="0"/>
+                <a:cs typeface="Avenir Book" charset="0"/>
+              </a:rPr>
+              <a:t>Surrounded by dense forest</a:t>
+            </a:r>
+          </a:p>
+          <a:p>
+            <a:pPr marL="342900" indent="-342900" defTabSz="3511068">
+              <a:buFont typeface="Arial" panose="020B0604020202020204" pitchFamily="34" charset="0"/>
+              <a:buChar char="•"/>
+            </a:pPr>
+            <a:r>
+              <a:rPr lang="en-US" sz="2000" dirty="0">
+                <a:solidFill>
+                  <a:prstClr val="black"/>
+                </a:solidFill>
+                <a:latin typeface="Avenir Book" charset="0"/>
+                <a:ea typeface="Avenir Book" charset="0"/>
+                <a:cs typeface="Avenir Book" charset="0"/>
+              </a:rPr>
+              <a:t>Shrubs, grasses, and various tree species.</a:t>
+            </a:r>
+          </a:p>
+          <a:p>
+            <a:pPr defTabSz="3511068"/>
+            <a:r>
+              <a:rPr lang="en-US" sz="3200" dirty="0">
+                <a:solidFill>
+                  <a:prstClr val="black"/>
+                </a:solidFill>
+                <a:latin typeface="Avenir Book" charset="0"/>
+                <a:ea typeface="Avenir Book" charset="0"/>
+                <a:cs typeface="Avenir Book" charset="0"/>
+              </a:rPr>
+              <a:t>Hydrology:</a:t>
+            </a:r>
+          </a:p>
+          <a:p>
+            <a:pPr marL="342900" indent="-342900" defTabSz="3511068">
+              <a:buFont typeface="Arial" panose="020B0604020202020204" pitchFamily="34" charset="0"/>
+              <a:buChar char="•"/>
+            </a:pPr>
+            <a:r>
+              <a:rPr lang="en-US" sz="2000" dirty="0">
+                <a:solidFill>
+                  <a:prstClr val="black"/>
+                </a:solidFill>
+                <a:latin typeface="Avenir Book" charset="0"/>
+                <a:ea typeface="Avenir Book" charset="0"/>
+                <a:cs typeface="Avenir Book" charset="0"/>
+              </a:rPr>
+              <a:t> A diverse stream with many turns, straights, and pools which is suitable for various fishes and macroinvertebrates</a:t>
+            </a:r>
+          </a:p>
+        </p:txBody>
+      </p:sp>
+      <p:pic>
+        <p:nvPicPr>
+          <p:cNvPr id="11" name="Picture 10">
+            <a:extLst>
+              <a:ext uri="{FF2B5EF4-FFF2-40B4-BE49-F238E27FC236}">
+                <a16:creationId xmlns:a16="http://schemas.microsoft.com/office/drawing/2014/main" id="{E9072077-F56E-3B80-1BBC-5C3C9F55F4A4}"/>
+              </a:ext>
+            </a:extLst>
+          </p:cNvPr>
+          <p:cNvPicPr>
+            <a:picLocks noChangeAspect="1"/>
+          </p:cNvPicPr>
+          <p:nvPr/>
+        </p:nvPicPr>
+        <p:blipFill rotWithShape="1">
+          <a:blip r:embed="rId11">
+            <a:extLst>
+              <a:ext uri="{28A0092B-C50C-407E-A947-70E740481C1C}">
+                <a14:useLocalDpi xmlns:a14="http://schemas.microsoft.com/office/drawing/2010/main" val="0"/>
+              </a:ext>
+            </a:extLst>
+          </a:blip>
+          <a:srcRect l="31291" r="26097"/>
+          <a:stretch/>
+        </p:blipFill>
+        <p:spPr>
+          <a:xfrm>
+            <a:off x="33328147" y="4651811"/>
+            <a:ext cx="4000641" cy="4964924"/>
+          </a:xfrm>
+          <a:prstGeom prst="rect">
+            <a:avLst/>
+          </a:prstGeom>
+        </p:spPr>
+      </p:pic>
     </p:spTree>
     <p:extLst>
       <p:ext uri="{BB962C8B-B14F-4D97-AF65-F5344CB8AC3E}">
@@ -6316,12 +7103,56 @@
 </file>
 
 <file path=customXml/item1.xml><?xml version="1.0" encoding="utf-8"?>
-<?mso-contentType ?>
-<FormTemplates xmlns="http://schemas.microsoft.com/sharepoint/v3/contenttype/forms">
-  <Display>DocumentLibraryForm</Display>
-  <Edit>DocumentLibraryForm</Edit>
-  <New>DocumentLibraryForm</New>
-</FormTemplates>
+<p:properties xmlns:p="http://schemas.microsoft.com/office/2006/metadata/properties" xmlns:xsi="http://www.w3.org/2001/XMLSchema-instance" xmlns:pc="http://schemas.microsoft.com/office/infopath/2007/PartnerControls">
+  <documentManagement>
+    <LMS_Mappings xmlns="6b544d46-9b2a-4003-bc91-8ec45b0e4a0d" xsi:nil="true"/>
+    <_ip_UnifiedCompliancePolicyUIAction xmlns="http://schemas.microsoft.com/sharepoint/v3" xsi:nil="true"/>
+    <Is_Collaboration_Space_Locked xmlns="6b544d46-9b2a-4003-bc91-8ec45b0e4a0d" xsi:nil="true"/>
+    <Math_Settings xmlns="6b544d46-9b2a-4003-bc91-8ec45b0e4a0d" xsi:nil="true"/>
+    <Members xmlns="6b544d46-9b2a-4003-bc91-8ec45b0e4a0d">
+      <UserInfo>
+        <DisplayName/>
+        <AccountId xsi:nil="true"/>
+        <AccountType/>
+      </UserInfo>
+    </Members>
+    <Has_Leaders_Only_SectionGroup xmlns="6b544d46-9b2a-4003-bc91-8ec45b0e4a0d" xsi:nil="true"/>
+    <Owner xmlns="6b544d46-9b2a-4003-bc91-8ec45b0e4a0d">
+      <UserInfo>
+        <DisplayName/>
+        <AccountId xsi:nil="true"/>
+        <AccountType/>
+      </UserInfo>
+    </Owner>
+    <Distribution_Groups xmlns="6b544d46-9b2a-4003-bc91-8ec45b0e4a0d" xsi:nil="true"/>
+    <Invited_Members xmlns="6b544d46-9b2a-4003-bc91-8ec45b0e4a0d" xsi:nil="true"/>
+    <Leaders xmlns="6b544d46-9b2a-4003-bc91-8ec45b0e4a0d">
+      <UserInfo>
+        <DisplayName/>
+        <AccountId xsi:nil="true"/>
+        <AccountType/>
+      </UserInfo>
+    </Leaders>
+    <_ip_UnifiedCompliancePolicyProperties xmlns="http://schemas.microsoft.com/sharepoint/v3" xsi:nil="true"/>
+    <Templates xmlns="6b544d46-9b2a-4003-bc91-8ec45b0e4a0d" xsi:nil="true"/>
+    <Self_Registration_Enabled xmlns="6b544d46-9b2a-4003-bc91-8ec45b0e4a0d" xsi:nil="true"/>
+    <AppVersion xmlns="6b544d46-9b2a-4003-bc91-8ec45b0e4a0d" xsi:nil="true"/>
+    <DefaultSectionNames xmlns="6b544d46-9b2a-4003-bc91-8ec45b0e4a0d" xsi:nil="true"/>
+    <CultureName xmlns="6b544d46-9b2a-4003-bc91-8ec45b0e4a0d" xsi:nil="true"/>
+    <TeamsChannelId xmlns="6b544d46-9b2a-4003-bc91-8ec45b0e4a0d" xsi:nil="true"/>
+    <Invited_Leaders xmlns="6b544d46-9b2a-4003-bc91-8ec45b0e4a0d" xsi:nil="true"/>
+    <IsNotebookLocked xmlns="6b544d46-9b2a-4003-bc91-8ec45b0e4a0d" xsi:nil="true"/>
+    <Member_Groups xmlns="6b544d46-9b2a-4003-bc91-8ec45b0e4a0d">
+      <UserInfo>
+        <DisplayName/>
+        <AccountId xsi:nil="true"/>
+        <AccountType/>
+      </UserInfo>
+    </Member_Groups>
+    <NotebookType xmlns="6b544d46-9b2a-4003-bc91-8ec45b0e4a0d" xsi:nil="true"/>
+    <FolderType xmlns="6b544d46-9b2a-4003-bc91-8ec45b0e4a0d" xsi:nil="true"/>
+  </documentManagement>
+</p:properties>
 </file>
 
 <file path=customXml/item2.xml><?xml version="1.0" encoding="utf-8"?>
@@ -6759,62 +7590,28 @@
 </file>
 
 <file path=customXml/item3.xml><?xml version="1.0" encoding="utf-8"?>
-<p:properties xmlns:p="http://schemas.microsoft.com/office/2006/metadata/properties" xmlns:xsi="http://www.w3.org/2001/XMLSchema-instance" xmlns:pc="http://schemas.microsoft.com/office/infopath/2007/PartnerControls">
-  <documentManagement>
-    <LMS_Mappings xmlns="6b544d46-9b2a-4003-bc91-8ec45b0e4a0d" xsi:nil="true"/>
-    <_ip_UnifiedCompliancePolicyUIAction xmlns="http://schemas.microsoft.com/sharepoint/v3" xsi:nil="true"/>
-    <Is_Collaboration_Space_Locked xmlns="6b544d46-9b2a-4003-bc91-8ec45b0e4a0d" xsi:nil="true"/>
-    <Math_Settings xmlns="6b544d46-9b2a-4003-bc91-8ec45b0e4a0d" xsi:nil="true"/>
-    <Members xmlns="6b544d46-9b2a-4003-bc91-8ec45b0e4a0d">
-      <UserInfo>
-        <DisplayName/>
-        <AccountId xsi:nil="true"/>
-        <AccountType/>
-      </UserInfo>
-    </Members>
-    <Has_Leaders_Only_SectionGroup xmlns="6b544d46-9b2a-4003-bc91-8ec45b0e4a0d" xsi:nil="true"/>
-    <Owner xmlns="6b544d46-9b2a-4003-bc91-8ec45b0e4a0d">
-      <UserInfo>
-        <DisplayName/>
-        <AccountId xsi:nil="true"/>
-        <AccountType/>
-      </UserInfo>
-    </Owner>
-    <Distribution_Groups xmlns="6b544d46-9b2a-4003-bc91-8ec45b0e4a0d" xsi:nil="true"/>
-    <Invited_Members xmlns="6b544d46-9b2a-4003-bc91-8ec45b0e4a0d" xsi:nil="true"/>
-    <Leaders xmlns="6b544d46-9b2a-4003-bc91-8ec45b0e4a0d">
-      <UserInfo>
-        <DisplayName/>
-        <AccountId xsi:nil="true"/>
-        <AccountType/>
-      </UserInfo>
-    </Leaders>
-    <_ip_UnifiedCompliancePolicyProperties xmlns="http://schemas.microsoft.com/sharepoint/v3" xsi:nil="true"/>
-    <Templates xmlns="6b544d46-9b2a-4003-bc91-8ec45b0e4a0d" xsi:nil="true"/>
-    <Self_Registration_Enabled xmlns="6b544d46-9b2a-4003-bc91-8ec45b0e4a0d" xsi:nil="true"/>
-    <AppVersion xmlns="6b544d46-9b2a-4003-bc91-8ec45b0e4a0d" xsi:nil="true"/>
-    <DefaultSectionNames xmlns="6b544d46-9b2a-4003-bc91-8ec45b0e4a0d" xsi:nil="true"/>
-    <CultureName xmlns="6b544d46-9b2a-4003-bc91-8ec45b0e4a0d" xsi:nil="true"/>
-    <TeamsChannelId xmlns="6b544d46-9b2a-4003-bc91-8ec45b0e4a0d" xsi:nil="true"/>
-    <Invited_Leaders xmlns="6b544d46-9b2a-4003-bc91-8ec45b0e4a0d" xsi:nil="true"/>
-    <IsNotebookLocked xmlns="6b544d46-9b2a-4003-bc91-8ec45b0e4a0d" xsi:nil="true"/>
-    <Member_Groups xmlns="6b544d46-9b2a-4003-bc91-8ec45b0e4a0d">
-      <UserInfo>
-        <DisplayName/>
-        <AccountId xsi:nil="true"/>
-        <AccountType/>
-      </UserInfo>
-    </Member_Groups>
-    <NotebookType xmlns="6b544d46-9b2a-4003-bc91-8ec45b0e4a0d" xsi:nil="true"/>
-    <FolderType xmlns="6b544d46-9b2a-4003-bc91-8ec45b0e4a0d" xsi:nil="true"/>
-  </documentManagement>
-</p:properties>
+<?mso-contentType ?>
+<FormTemplates xmlns="http://schemas.microsoft.com/sharepoint/v3/contenttype/forms">
+  <Display>DocumentLibraryForm</Display>
+  <Edit>DocumentLibraryForm</Edit>
+  <New>DocumentLibraryForm</New>
+</FormTemplates>
 </file>
 
 <file path=customXml/itemProps1.xml><?xml version="1.0" encoding="utf-8"?>
-<ds:datastoreItem xmlns:ds="http://schemas.openxmlformats.org/officeDocument/2006/customXml" ds:itemID="{61FBE2F1-E3E5-4809-A97E-1E6B42890106}">
+<ds:datastoreItem xmlns:ds="http://schemas.openxmlformats.org/officeDocument/2006/customXml" ds:itemID="{2D9B16B1-920C-4381-AE81-4B78D59980E0}">
   <ds:schemaRefs>
-    <ds:schemaRef ds:uri="http://schemas.microsoft.com/sharepoint/v3/contenttype/forms"/>
+    <ds:schemaRef ds:uri="http://purl.org/dc/terms/"/>
+    <ds:schemaRef ds:uri="24a4780b-b9b8-490f-9267-7801a440b1c2"/>
+    <ds:schemaRef ds:uri="http://schemas.microsoft.com/office/2006/documentManagement/types"/>
+    <ds:schemaRef ds:uri="http://purl.org/dc/dcmitype/"/>
+    <ds:schemaRef ds:uri="http://schemas.microsoft.com/office/2006/metadata/properties"/>
+    <ds:schemaRef ds:uri="http://purl.org/dc/elements/1.1/"/>
+    <ds:schemaRef ds:uri="http://www.w3.org/XML/1998/namespace"/>
+    <ds:schemaRef ds:uri="http://schemas.microsoft.com/sharepoint/v3"/>
+    <ds:schemaRef ds:uri="http://schemas.openxmlformats.org/package/2006/metadata/core-properties"/>
+    <ds:schemaRef ds:uri="http://schemas.microsoft.com/office/infopath/2007/PartnerControls"/>
+    <ds:schemaRef ds:uri="6b544d46-9b2a-4003-bc91-8ec45b0e4a0d"/>
   </ds:schemaRefs>
 </ds:datastoreItem>
 </file>
@@ -6840,19 +7637,9 @@
 </file>
 
 <file path=customXml/itemProps3.xml><?xml version="1.0" encoding="utf-8"?>
-<ds:datastoreItem xmlns:ds="http://schemas.openxmlformats.org/officeDocument/2006/customXml" ds:itemID="{2D9B16B1-920C-4381-AE81-4B78D59980E0}">
+<ds:datastoreItem xmlns:ds="http://schemas.openxmlformats.org/officeDocument/2006/customXml" ds:itemID="{61FBE2F1-E3E5-4809-A97E-1E6B42890106}">
   <ds:schemaRefs>
-    <ds:schemaRef ds:uri="http://purl.org/dc/terms/"/>
-    <ds:schemaRef ds:uri="24a4780b-b9b8-490f-9267-7801a440b1c2"/>
-    <ds:schemaRef ds:uri="http://schemas.microsoft.com/office/2006/documentManagement/types"/>
-    <ds:schemaRef ds:uri="http://purl.org/dc/dcmitype/"/>
-    <ds:schemaRef ds:uri="http://schemas.microsoft.com/office/2006/metadata/properties"/>
-    <ds:schemaRef ds:uri="http://purl.org/dc/elements/1.1/"/>
-    <ds:schemaRef ds:uri="http://www.w3.org/XML/1998/namespace"/>
-    <ds:schemaRef ds:uri="http://schemas.microsoft.com/sharepoint/v3"/>
-    <ds:schemaRef ds:uri="http://schemas.openxmlformats.org/package/2006/metadata/core-properties"/>
-    <ds:schemaRef ds:uri="http://schemas.microsoft.com/office/infopath/2007/PartnerControls"/>
-    <ds:schemaRef ds:uri="6b544d46-9b2a-4003-bc91-8ec45b0e4a0d"/>
+    <ds:schemaRef ds:uri="http://schemas.microsoft.com/sharepoint/v3/contenttype/forms"/>
   </ds:schemaRefs>
 </ds:datastoreItem>
 </file>
</xml_diff>